<commit_message>
Update 07.0 -- 广播 ------- 第07章.pptx
</commit_message>
<xml_diff>
--- a/07.0 -- 广播 ------- 第07章.pptx
+++ b/07.0 -- 广播 ------- 第07章.pptx
@@ -331,7 +331,7 @@
               <a:pPr>
                 <a:defRPr/>
               </a:pPr>
-              <a:t>2020/10/25</a:t>
+              <a:t>2020/11/22</a:t>
             </a:fld>
             <a:endParaRPr lang="zh-CN" altLang="en-US" sz="1200"/>
           </a:p>
@@ -1262,7 +1262,7 @@
             <a:fld id="{C33D8BF3-04B1-4578-9944-A784348B543C}" type="datetimeFigureOut">
               <a:rPr lang="zh-CN" altLang="en-US"/>
               <a:pPr/>
-              <a:t>2020/10/25</a:t>
+              <a:t>2020/11/22</a:t>
             </a:fld>
             <a:endParaRPr lang="zh-CN" altLang="en-US"/>
           </a:p>
@@ -1461,7 +1461,7 @@
             <a:fld id="{C33D8BF3-04B1-4578-9944-A784348B543C}" type="datetimeFigureOut">
               <a:rPr lang="zh-CN" altLang="en-US"/>
               <a:pPr/>
-              <a:t>2020/10/25</a:t>
+              <a:t>2020/11/22</a:t>
             </a:fld>
             <a:endParaRPr lang="zh-CN" altLang="en-US"/>
           </a:p>
@@ -1610,7 +1610,7 @@
             <a:fld id="{C33D8BF3-04B1-4578-9944-A784348B543C}" type="datetimeFigureOut">
               <a:rPr lang="zh-CN" altLang="en-US"/>
               <a:pPr/>
-              <a:t>2020/10/25</a:t>
+              <a:t>2020/11/22</a:t>
             </a:fld>
             <a:endParaRPr lang="zh-CN" altLang="en-US"/>
           </a:p>
@@ -1759,7 +1759,7 @@
             <a:fld id="{C33D8BF3-04B1-4578-9944-A784348B543C}" type="datetimeFigureOut">
               <a:rPr lang="zh-CN" altLang="en-US"/>
               <a:pPr/>
-              <a:t>2020/10/25</a:t>
+              <a:t>2020/11/22</a:t>
             </a:fld>
             <a:endParaRPr lang="zh-CN" altLang="en-US"/>
           </a:p>
@@ -1961,7 +1961,7 @@
             <a:fld id="{C33D8BF3-04B1-4578-9944-A784348B543C}" type="datetimeFigureOut">
               <a:rPr lang="zh-CN" altLang="en-US"/>
               <a:pPr/>
-              <a:t>2020/10/25</a:t>
+              <a:t>2020/11/22</a:t>
             </a:fld>
             <a:endParaRPr lang="zh-CN" altLang="en-US"/>
           </a:p>
@@ -2350,7 +2350,7 @@
             <a:fld id="{C33D8BF3-04B1-4578-9944-A784348B543C}" type="datetimeFigureOut">
               <a:rPr lang="zh-CN" altLang="en-US"/>
               <a:pPr/>
-              <a:t>2020/10/25</a:t>
+              <a:t>2020/11/22</a:t>
             </a:fld>
             <a:endParaRPr lang="zh-CN" altLang="en-US"/>
           </a:p>
@@ -2618,7 +2618,7 @@
             <a:fld id="{C33D8BF3-04B1-4578-9944-A784348B543C}" type="datetimeFigureOut">
               <a:rPr lang="zh-CN" altLang="en-US"/>
               <a:pPr/>
-              <a:t>2020/10/25</a:t>
+              <a:t>2020/11/22</a:t>
             </a:fld>
             <a:endParaRPr lang="zh-CN" altLang="en-US"/>
           </a:p>
@@ -3021,7 +3021,7 @@
             <a:fld id="{C33D8BF3-04B1-4578-9944-A784348B543C}" type="datetimeFigureOut">
               <a:rPr lang="zh-CN" altLang="en-US"/>
               <a:pPr/>
-              <a:t>2020/10/25</a:t>
+              <a:t>2020/11/22</a:t>
             </a:fld>
             <a:endParaRPr lang="zh-CN" altLang="en-US"/>
           </a:p>
@@ -4510,7 +4510,7 @@
             <a:fld id="{C33D8BF3-04B1-4578-9944-A784348B543C}" type="datetimeFigureOut">
               <a:rPr lang="zh-CN" altLang="en-US"/>
               <a:pPr/>
-              <a:t>2020/10/25</a:t>
+              <a:t>2020/11/22</a:t>
             </a:fld>
             <a:endParaRPr lang="zh-CN" altLang="en-US"/>
           </a:p>
@@ -4637,7 +4637,7 @@
             <a:fld id="{C33D8BF3-04B1-4578-9944-A784348B543C}" type="datetimeFigureOut">
               <a:rPr lang="zh-CN" altLang="en-US"/>
               <a:pPr/>
-              <a:t>2020/10/25</a:t>
+              <a:t>2020/11/22</a:t>
             </a:fld>
             <a:endParaRPr lang="zh-CN" altLang="en-US"/>
           </a:p>
@@ -4853,7 +4853,7 @@
             <a:fld id="{C33D8BF3-04B1-4578-9944-A784348B543C}" type="datetimeFigureOut">
               <a:rPr lang="zh-CN" altLang="en-US"/>
               <a:pPr/>
-              <a:t>2020/10/25</a:t>
+              <a:t>2020/11/22</a:t>
             </a:fld>
             <a:endParaRPr lang="zh-CN" altLang="en-US"/>
           </a:p>
@@ -5075,7 +5075,7 @@
             <a:fld id="{C33D8BF3-04B1-4578-9944-A784348B543C}" type="datetimeFigureOut">
               <a:rPr lang="zh-CN" altLang="en-US"/>
               <a:pPr/>
-              <a:t>2020/10/25</a:t>
+              <a:t>2020/11/22</a:t>
             </a:fld>
             <a:endParaRPr lang="zh-CN" altLang="en-US"/>
           </a:p>
@@ -5485,7 +5485,7 @@
             <a:fld id="{C33D8BF3-04B1-4578-9944-A784348B543C}" type="datetimeFigureOut">
               <a:rPr lang="zh-CN" altLang="en-US"/>
               <a:pPr/>
-              <a:t>2020/10/25</a:t>
+              <a:t>2020/11/22</a:t>
             </a:fld>
             <a:endParaRPr lang="zh-CN" altLang="en-US"/>
           </a:p>
@@ -6192,19 +6192,23 @@
         </p:nvSpPr>
         <p:spPr>
           <a:xfrm>
-            <a:off x="3825875" y="1285875"/>
-            <a:ext cx="2449513" cy="2870200"/>
+            <a:off x="3718963" y="1350963"/>
+            <a:ext cx="5308689" cy="2614177"/>
           </a:xfrm>
           <a:prstGeom prst="rect">
             <a:avLst/>
           </a:prstGeom>
-          <a:noFill/>
+          <a:solidFill>
+            <a:schemeClr val="bg1">
+              <a:lumMod val="85000"/>
+            </a:schemeClr>
+          </a:solidFill>
           <a:ln w="9525">
             <a:noFill/>
           </a:ln>
         </p:spPr>
         <p:txBody>
-          <a:bodyPr wrap="none" lIns="68580" tIns="34290" rIns="68580" bIns="34290">
+          <a:bodyPr wrap="square" lIns="68580" tIns="34290" rIns="68580" bIns="34290">
             <a:spAutoFit/>
           </a:bodyPr>
           <a:lstStyle/>
@@ -6408,14 +6412,6 @@
               </a:rPr>
               <a:t>本章小结</a:t>
             </a:r>
-            <a:endParaRPr lang="zh-CN" altLang="en-US" sz="1400" b="1" dirty="0"/>
-          </a:p>
-          <a:p>
-            <a:pPr marL="214630" indent="-214630">
-              <a:buFont typeface="Wingdings" panose="05000000000000000000" pitchFamily="2" charset="2"/>
-              <a:buChar char="p"/>
-              <a:defRPr/>
-            </a:pPr>
             <a:endParaRPr lang="zh-CN" altLang="en-US" sz="1400" dirty="0">
               <a:solidFill>
                 <a:srgbClr val="262626"/>
@@ -6493,7 +6489,7 @@
         </p:nvSpPr>
         <p:spPr>
           <a:xfrm>
-            <a:off x="3608388" y="3940175"/>
+            <a:off x="3707940" y="3975745"/>
             <a:ext cx="5319712" cy="201613"/>
           </a:xfrm>
           <a:prstGeom prst="rect">
@@ -7406,35 +7402,20 @@
         </p:blipFill>
         <p:spPr bwMode="auto">
           <a:xfrm>
-            <a:off x="1228725" y="1787525"/>
-            <a:ext cx="6064250" cy="1771650"/>
+            <a:off x="899745" y="1779695"/>
+            <a:ext cx="6788931" cy="1983363"/>
           </a:xfrm>
           <a:prstGeom prst="rect">
             <a:avLst/>
           </a:prstGeom>
-          <a:noFill/>
+          <a:solidFill>
+            <a:schemeClr val="bg1">
+              <a:lumMod val="85000"/>
+            </a:schemeClr>
+          </a:solidFill>
           <a:ln>
             <a:noFill/>
           </a:ln>
-          <a:extLst>
-            <a:ext uri="{909E8E84-426E-40DD-AFC4-6F175D3DCCD1}">
-              <a14:hiddenFill xmlns:a14="http://schemas.microsoft.com/office/drawing/2010/main">
-                <a:solidFill>
-                  <a:srgbClr val="FFFFFF"/>
-                </a:solidFill>
-              </a14:hiddenFill>
-            </a:ext>
-            <a:ext uri="{91240B29-F687-4F45-9708-019B960494DF}">
-              <a14:hiddenLine xmlns:a14="http://schemas.microsoft.com/office/drawing/2010/main" w="9525">
-                <a:solidFill>
-                  <a:srgbClr val="000000"/>
-                </a:solidFill>
-                <a:miter lim="800000"/>
-                <a:headEnd/>
-                <a:tailEnd/>
-              </a14:hiddenLine>
-            </a:ext>
-          </a:extLst>
         </p:spPr>
       </p:pic>
     </p:spTree>
@@ -8682,35 +8663,20 @@
         </p:nvSpPr>
         <p:spPr bwMode="auto">
           <a:xfrm>
-            <a:off x="2665413" y="803275"/>
-            <a:ext cx="4906962" cy="1428750"/>
+            <a:off x="2665412" y="803275"/>
+            <a:ext cx="6154882" cy="798513"/>
           </a:xfrm>
           <a:prstGeom prst="rect">
             <a:avLst/>
           </a:prstGeom>
-          <a:noFill/>
+          <a:solidFill>
+            <a:schemeClr val="bg1">
+              <a:lumMod val="85000"/>
+            </a:schemeClr>
+          </a:solidFill>
           <a:ln>
             <a:noFill/>
           </a:ln>
-          <a:extLst>
-            <a:ext uri="{909E8E84-426E-40DD-AFC4-6F175D3DCCD1}">
-              <a14:hiddenFill xmlns:a14="http://schemas.microsoft.com/office/drawing/2010/main">
-                <a:solidFill>
-                  <a:srgbClr val="FFFFFF"/>
-                </a:solidFill>
-              </a14:hiddenFill>
-            </a:ext>
-            <a:ext uri="{91240B29-F687-4F45-9708-019B960494DF}">
-              <a14:hiddenLine xmlns:a14="http://schemas.microsoft.com/office/drawing/2010/main" w="9525">
-                <a:solidFill>
-                  <a:srgbClr val="000000"/>
-                </a:solidFill>
-                <a:miter lim="800000"/>
-                <a:headEnd/>
-                <a:tailEnd/>
-              </a14:hiddenLine>
-            </a:ext>
-          </a:extLst>
         </p:spPr>
         <p:txBody>
           <a:bodyPr/>
@@ -8835,7 +8801,7 @@
               </a:buClr>
             </a:pPr>
             <a:r>
-              <a:rPr lang="zh-CN" altLang="en-US" sz="1400">
+              <a:rPr lang="zh-CN" altLang="en-US" sz="1400" dirty="0">
                 <a:latin typeface="微软雅黑" panose="020B0503020204020204" pitchFamily="34" charset="-122"/>
                 <a:ea typeface="微软雅黑" panose="020B0503020204020204" pitchFamily="34" charset="-122"/>
                 <a:sym typeface="微软雅黑" panose="020B0503020204020204" pitchFamily="34" charset="-122"/>
@@ -8843,7 +8809,7 @@
               <a:t>点击按钮时，向</a:t>
             </a:r>
             <a:r>
-              <a:rPr lang="en-US" altLang="zh-CN" sz="1400">
+              <a:rPr lang="en-US" altLang="zh-CN" sz="1400" dirty="0">
                 <a:latin typeface="微软雅黑" panose="020B0503020204020204" pitchFamily="34" charset="-122"/>
                 <a:ea typeface="微软雅黑" panose="020B0503020204020204" pitchFamily="34" charset="-122"/>
                 <a:sym typeface="微软雅黑" panose="020B0503020204020204" pitchFamily="34" charset="-122"/>
@@ -8851,7 +8817,7 @@
               <a:t>Android</a:t>
             </a:r>
             <a:r>
-              <a:rPr lang="zh-CN" altLang="en-US" sz="1400">
+              <a:rPr lang="zh-CN" altLang="en-US" sz="1400" dirty="0">
                 <a:latin typeface="微软雅黑" panose="020B0503020204020204" pitchFamily="34" charset="-122"/>
                 <a:ea typeface="微软雅黑" panose="020B0503020204020204" pitchFamily="34" charset="-122"/>
                 <a:sym typeface="微软雅黑" panose="020B0503020204020204" pitchFamily="34" charset="-122"/>
@@ -8869,7 +8835,7 @@
               </a:buClr>
             </a:pPr>
             <a:r>
-              <a:rPr lang="zh-CN" altLang="en-US" sz="1400">
+              <a:rPr lang="zh-CN" altLang="en-US" sz="1400" dirty="0">
                 <a:latin typeface="微软雅黑" panose="020B0503020204020204" pitchFamily="34" charset="-122"/>
                 <a:ea typeface="微软雅黑" panose="020B0503020204020204" pitchFamily="34" charset="-122"/>
                 <a:sym typeface="微软雅黑" panose="020B0503020204020204" pitchFamily="34" charset="-122"/>
@@ -8877,7 +8843,7 @@
               <a:t>通过</a:t>
             </a:r>
             <a:r>
-              <a:rPr lang="en-US" altLang="zh-CN" sz="1400">
+              <a:rPr lang="en-US" altLang="zh-CN" sz="1400" dirty="0">
                 <a:latin typeface="微软雅黑" panose="020B0503020204020204" pitchFamily="34" charset="-122"/>
                 <a:ea typeface="微软雅黑" panose="020B0503020204020204" pitchFamily="34" charset="-122"/>
                 <a:sym typeface="微软雅黑" panose="020B0503020204020204" pitchFamily="34" charset="-122"/>
@@ -8885,7 +8851,7 @@
               <a:t>Log</a:t>
             </a:r>
             <a:r>
-              <a:rPr lang="zh-CN" altLang="en-US" sz="1400">
+              <a:rPr lang="zh-CN" altLang="en-US" sz="1400" dirty="0">
                 <a:latin typeface="微软雅黑" panose="020B0503020204020204" pitchFamily="34" charset="-122"/>
                 <a:ea typeface="微软雅黑" panose="020B0503020204020204" pitchFamily="34" charset="-122"/>
                 <a:sym typeface="微软雅黑" panose="020B0503020204020204" pitchFamily="34" charset="-122"/>
@@ -8893,7 +8859,7 @@
               <a:t>视窗观察看到</a:t>
             </a:r>
             <a:r>
-              <a:rPr lang="en-US" altLang="zh-CN" sz="1400">
+              <a:rPr lang="en-US" altLang="zh-CN" sz="1400" dirty="0">
                 <a:latin typeface="微软雅黑" panose="020B0503020204020204" pitchFamily="34" charset="-122"/>
                 <a:ea typeface="微软雅黑" panose="020B0503020204020204" pitchFamily="34" charset="-122"/>
                 <a:sym typeface="微软雅黑" panose="020B0503020204020204" pitchFamily="34" charset="-122"/>
@@ -8901,7 +8867,7 @@
               <a:t>Android</a:t>
             </a:r>
             <a:r>
-              <a:rPr lang="zh-CN" altLang="en-US" sz="1400">
+              <a:rPr lang="zh-CN" altLang="en-US" sz="1400" dirty="0">
                 <a:latin typeface="微软雅黑" panose="020B0503020204020204" pitchFamily="34" charset="-122"/>
                 <a:ea typeface="微软雅黑" panose="020B0503020204020204" pitchFamily="34" charset="-122"/>
                 <a:sym typeface="微软雅黑" panose="020B0503020204020204" pitchFamily="34" charset="-122"/>
@@ -8919,7 +8885,7 @@
               </a:buClr>
             </a:pPr>
             <a:r>
-              <a:rPr lang="zh-CN" altLang="en-US" sz="1400">
+              <a:rPr lang="zh-CN" altLang="en-US" sz="1400" dirty="0">
                 <a:latin typeface="微软雅黑" panose="020B0503020204020204" pitchFamily="34" charset="-122"/>
                 <a:ea typeface="微软雅黑" panose="020B0503020204020204" pitchFamily="34" charset="-122"/>
                 <a:sym typeface="微软雅黑" panose="020B0503020204020204" pitchFamily="34" charset="-122"/>
@@ -8936,7 +8902,7 @@
                 <a:schemeClr val="hlink"/>
               </a:buClr>
             </a:pPr>
-            <a:endParaRPr lang="zh-CN" altLang="en-US">
+            <a:endParaRPr lang="zh-CN" altLang="en-US" dirty="0">
               <a:sym typeface="Arial" panose="020B0604020202020204" pitchFamily="34" charset="0"/>
             </a:endParaRPr>
           </a:p>
@@ -8971,8 +8937,8 @@
         </p:blipFill>
         <p:spPr bwMode="auto">
           <a:xfrm>
-            <a:off x="2593975" y="1876425"/>
-            <a:ext cx="6511925" cy="1069975"/>
+            <a:off x="2665411" y="1785937"/>
+            <a:ext cx="4642210" cy="762762"/>
           </a:xfrm>
           <a:prstGeom prst="rect">
             <a:avLst/>
@@ -9103,38 +9069,23 @@
         </p:nvSpPr>
         <p:spPr bwMode="auto">
           <a:xfrm>
-            <a:off x="2870200" y="3013075"/>
-            <a:ext cx="4349750" cy="522288"/>
+            <a:off x="2665411" y="3291800"/>
+            <a:ext cx="6154883" cy="307777"/>
           </a:xfrm>
           <a:prstGeom prst="rect">
             <a:avLst/>
           </a:prstGeom>
-          <a:noFill/>
+          <a:solidFill>
+            <a:schemeClr val="bg1">
+              <a:lumMod val="85000"/>
+            </a:schemeClr>
+          </a:solidFill>
           <a:ln>
             <a:noFill/>
           </a:ln>
-          <a:extLst>
-            <a:ext uri="{909E8E84-426E-40DD-AFC4-6F175D3DCCD1}">
-              <a14:hiddenFill xmlns:a14="http://schemas.microsoft.com/office/drawing/2010/main">
-                <a:solidFill>
-                  <a:srgbClr val="FFFFFF"/>
-                </a:solidFill>
-              </a14:hiddenFill>
-            </a:ext>
-            <a:ext uri="{91240B29-F687-4F45-9708-019B960494DF}">
-              <a14:hiddenLine xmlns:a14="http://schemas.microsoft.com/office/drawing/2010/main" w="9525">
-                <a:solidFill>
-                  <a:srgbClr val="000000"/>
-                </a:solidFill>
-                <a:miter lim="800000"/>
-                <a:headEnd/>
-                <a:tailEnd/>
-              </a14:hiddenLine>
-            </a:ext>
-          </a:extLst>
         </p:spPr>
         <p:txBody>
-          <a:bodyPr>
+          <a:bodyPr wrap="square">
             <a:spAutoFit/>
           </a:bodyPr>
           <a:lstStyle>
@@ -9300,8 +9251,8 @@
         </p:blipFill>
         <p:spPr bwMode="auto">
           <a:xfrm>
-            <a:off x="2667000" y="3535363"/>
-            <a:ext cx="6438900" cy="1316037"/>
+            <a:off x="2665411" y="3799724"/>
+            <a:ext cx="4640621" cy="948489"/>
           </a:xfrm>
           <a:prstGeom prst="rect">
             <a:avLst/>
@@ -9620,166 +9571,285 @@
         </p:nvSpPr>
         <p:spPr bwMode="auto">
           <a:xfrm>
-            <a:off x="250825" y="1506538"/>
-            <a:ext cx="8728075" cy="2676525"/>
+            <a:off x="683730" y="1491675"/>
+            <a:ext cx="7243800" cy="2554545"/>
           </a:xfrm>
           <a:prstGeom prst="rect">
             <a:avLst/>
           </a:prstGeom>
-          <a:noFill/>
+          <a:solidFill>
+            <a:schemeClr val="bg1">
+              <a:lumMod val="85000"/>
+            </a:schemeClr>
+          </a:solidFill>
           <a:ln>
             <a:noFill/>
           </a:ln>
-          <a:extLst>
-            <a:ext uri="{909E8E84-426E-40DD-AFC4-6F175D3DCCD1}">
-              <a14:hiddenFill xmlns:a14="http://schemas.microsoft.com/office/drawing/2010/main">
-                <a:solidFill>
-                  <a:srgbClr val="FFFFFF"/>
-                </a:solidFill>
-              </a14:hiddenFill>
-            </a:ext>
-            <a:ext uri="{91240B29-F687-4F45-9708-019B960494DF}">
-              <a14:hiddenLine xmlns:a14="http://schemas.microsoft.com/office/drawing/2010/main" w="9525">
-                <a:solidFill>
-                  <a:srgbClr val="000000"/>
-                </a:solidFill>
-                <a:miter lim="800000"/>
-                <a:headEnd/>
-                <a:tailEnd/>
-              </a14:hiddenLine>
-            </a:ext>
-          </a:extLst>
         </p:spPr>
         <p:txBody>
-          <a:bodyPr>
+          <a:bodyPr wrap="square">
             <a:spAutoFit/>
           </a:bodyPr>
           <a:lstStyle/>
           <a:p>
-            <a:endParaRPr lang="en-US" altLang="zh-CN" sz="1400">
-              <a:solidFill>
-                <a:srgbClr val="000000"/>
-              </a:solidFill>
-              <a:latin typeface="Times New Roman" panose="02020603050405020304" pitchFamily="18" charset="0"/>
-              <a:sym typeface="Times New Roman" panose="02020603050405020304" pitchFamily="18" charset="0"/>
-            </a:endParaRPr>
+            <a:r>
+              <a:rPr lang="en-US" altLang="zh-CN" sz="2000" dirty="0">
+                <a:solidFill>
+                  <a:srgbClr val="000000"/>
+                </a:solidFill>
+                <a:latin typeface="Times New Roman" panose="02020603050405020304" pitchFamily="18" charset="0"/>
+                <a:sym typeface="Times New Roman" panose="02020603050405020304" pitchFamily="18" charset="0"/>
+              </a:rPr>
+              <a:t>public void </a:t>
+            </a:r>
+            <a:r>
+              <a:rPr lang="en-US" altLang="zh-CN" sz="2000" dirty="0" err="1">
+                <a:solidFill>
+                  <a:srgbClr val="000000"/>
+                </a:solidFill>
+                <a:latin typeface="Times New Roman" panose="02020603050405020304" pitchFamily="18" charset="0"/>
+                <a:sym typeface="Times New Roman" panose="02020603050405020304" pitchFamily="18" charset="0"/>
+              </a:rPr>
+              <a:t>onClick</a:t>
+            </a:r>
+            <a:r>
+              <a:rPr lang="en-US" altLang="zh-CN" sz="2000" dirty="0">
+                <a:solidFill>
+                  <a:srgbClr val="000000"/>
+                </a:solidFill>
+                <a:latin typeface="Times New Roman" panose="02020603050405020304" pitchFamily="18" charset="0"/>
+                <a:sym typeface="Times New Roman" panose="02020603050405020304" pitchFamily="18" charset="0"/>
+              </a:rPr>
+              <a:t>(View v) </a:t>
+            </a:r>
           </a:p>
           <a:p>
             <a:r>
-              <a:rPr lang="en-US" altLang="zh-CN" sz="2000">
+              <a:rPr lang="en-US" altLang="zh-CN" sz="2000" dirty="0">
                 <a:solidFill>
                   <a:srgbClr val="000000"/>
                 </a:solidFill>
                 <a:latin typeface="Times New Roman" panose="02020603050405020304" pitchFamily="18" charset="0"/>
                 <a:sym typeface="Times New Roman" panose="02020603050405020304" pitchFamily="18" charset="0"/>
               </a:rPr>
-              <a:t>	     public void onClick(View v) {</a:t>
+              <a:t>{</a:t>
             </a:r>
           </a:p>
           <a:p>
             <a:r>
-              <a:rPr lang="en-US" altLang="zh-CN" sz="2000">
+              <a:rPr lang="en-US" altLang="zh-CN" sz="2000" dirty="0">
                 <a:solidFill>
                   <a:srgbClr val="000000"/>
                 </a:solidFill>
                 <a:latin typeface="Times New Roman" panose="02020603050405020304" pitchFamily="18" charset="0"/>
                 <a:sym typeface="Times New Roman" panose="02020603050405020304" pitchFamily="18" charset="0"/>
               </a:rPr>
-              <a:t>	           // TODO Auto-generated method stub</a:t>
+              <a:t>// TODO Auto-generated method stub</a:t>
             </a:r>
           </a:p>
           <a:p>
             <a:r>
-              <a:rPr lang="en-US" altLang="zh-CN" sz="2000">
+              <a:rPr lang="en-US" altLang="zh-CN" sz="2000" dirty="0">
                 <a:solidFill>
                   <a:srgbClr val="000000"/>
                 </a:solidFill>
                 <a:latin typeface="Times New Roman" panose="02020603050405020304" pitchFamily="18" charset="0"/>
                 <a:sym typeface="Times New Roman" panose="02020603050405020304" pitchFamily="18" charset="0"/>
               </a:rPr>
-              <a:t>                         String Intent_Action = "</a:t>
-            </a:r>
-            <a:r>
-              <a:rPr lang="en-US" altLang="zh-CN" sz="2000" b="1">
-                <a:solidFill>
-                  <a:srgbClr val="00B050"/>
+              <a:t>String </a:t>
+            </a:r>
+            <a:r>
+              <a:rPr lang="en-US" altLang="zh-CN" sz="2000" dirty="0" err="1">
+                <a:solidFill>
+                  <a:srgbClr val="000000"/>
                 </a:solidFill>
                 <a:latin typeface="Times New Roman" panose="02020603050405020304" pitchFamily="18" charset="0"/>
                 <a:sym typeface="Times New Roman" panose="02020603050405020304" pitchFamily="18" charset="0"/>
               </a:rPr>
-              <a:t>com.android.BroadcastReceiverDemo</a:t>
-            </a:r>
-            <a:r>
-              <a:rPr lang="en-US" altLang="zh-CN" sz="2000">
+              <a:t>Intent_Action</a:t>
+            </a:r>
+            <a:r>
+              <a:rPr lang="en-US" altLang="zh-CN" sz="2000" dirty="0">
                 <a:solidFill>
                   <a:srgbClr val="000000"/>
                 </a:solidFill>
                 <a:latin typeface="Times New Roman" panose="02020603050405020304" pitchFamily="18" charset="0"/>
                 <a:sym typeface="Times New Roman" panose="02020603050405020304" pitchFamily="18" charset="0"/>
               </a:rPr>
+              <a:t> = "</a:t>
+            </a:r>
+            <a:r>
+              <a:rPr lang="en-US" altLang="zh-CN" sz="2000" b="1" dirty="0" err="1">
+                <a:solidFill>
+                  <a:srgbClr val="00B050"/>
+                </a:solidFill>
+                <a:latin typeface="Times New Roman" panose="02020603050405020304" pitchFamily="18" charset="0"/>
+                <a:sym typeface="Times New Roman" panose="02020603050405020304" pitchFamily="18" charset="0"/>
+              </a:rPr>
+              <a:t>com.android.BroadcastReceiverDemo</a:t>
+            </a:r>
+            <a:r>
+              <a:rPr lang="en-US" altLang="zh-CN" sz="2000" dirty="0">
+                <a:solidFill>
+                  <a:srgbClr val="000000"/>
+                </a:solidFill>
+                <a:latin typeface="Times New Roman" panose="02020603050405020304" pitchFamily="18" charset="0"/>
+                <a:sym typeface="Times New Roman" panose="02020603050405020304" pitchFamily="18" charset="0"/>
+              </a:rPr>
               <a:t>";</a:t>
             </a:r>
           </a:p>
           <a:p>
             <a:r>
-              <a:rPr lang="en-US" altLang="zh-CN" sz="2000">
+              <a:rPr lang="en-US" altLang="zh-CN" sz="2000" dirty="0">
                 <a:solidFill>
                   <a:srgbClr val="000000"/>
                 </a:solidFill>
                 <a:latin typeface="Times New Roman" panose="02020603050405020304" pitchFamily="18" charset="0"/>
                 <a:sym typeface="Times New Roman" panose="02020603050405020304" pitchFamily="18" charset="0"/>
               </a:rPr>
-              <a:t>	           Intent intent = new Intent(Intent_Action);</a:t>
+              <a:t>Intent </a:t>
+            </a:r>
+            <a:r>
+              <a:rPr lang="en-US" altLang="zh-CN" sz="2000" dirty="0" err="1">
+                <a:solidFill>
+                  <a:srgbClr val="000000"/>
+                </a:solidFill>
+                <a:latin typeface="Times New Roman" panose="02020603050405020304" pitchFamily="18" charset="0"/>
+                <a:sym typeface="Times New Roman" panose="02020603050405020304" pitchFamily="18" charset="0"/>
+              </a:rPr>
+              <a:t>intent</a:t>
+            </a:r>
+            <a:r>
+              <a:rPr lang="en-US" altLang="zh-CN" sz="2000" dirty="0">
+                <a:solidFill>
+                  <a:srgbClr val="000000"/>
+                </a:solidFill>
+                <a:latin typeface="Times New Roman" panose="02020603050405020304" pitchFamily="18" charset="0"/>
+                <a:sym typeface="Times New Roman" panose="02020603050405020304" pitchFamily="18" charset="0"/>
+              </a:rPr>
+              <a:t> = new Intent(</a:t>
+            </a:r>
+            <a:r>
+              <a:rPr lang="en-US" altLang="zh-CN" sz="2000" dirty="0" err="1">
+                <a:solidFill>
+                  <a:srgbClr val="000000"/>
+                </a:solidFill>
+                <a:latin typeface="Times New Roman" panose="02020603050405020304" pitchFamily="18" charset="0"/>
+                <a:sym typeface="Times New Roman" panose="02020603050405020304" pitchFamily="18" charset="0"/>
+              </a:rPr>
+              <a:t>Intent_Action</a:t>
+            </a:r>
+            <a:r>
+              <a:rPr lang="en-US" altLang="zh-CN" sz="2000" dirty="0">
+                <a:solidFill>
+                  <a:srgbClr val="000000"/>
+                </a:solidFill>
+                <a:latin typeface="Times New Roman" panose="02020603050405020304" pitchFamily="18" charset="0"/>
+                <a:sym typeface="Times New Roman" panose="02020603050405020304" pitchFamily="18" charset="0"/>
+              </a:rPr>
+              <a:t>);</a:t>
             </a:r>
           </a:p>
           <a:p>
             <a:r>
-              <a:rPr lang="en-US" altLang="zh-CN" sz="2000">
-                <a:solidFill>
-                  <a:srgbClr val="000000"/>
-                </a:solidFill>
+              <a:rPr lang="en-US" altLang="zh-CN" sz="2000" b="1" dirty="0" err="1">
+                <a:solidFill>
+                  <a:srgbClr val="0070C0"/>
+                </a:solidFill>
+                <a:highlight>
+                  <a:srgbClr val="FFFF00"/>
+                </a:highlight>
                 <a:latin typeface="Times New Roman" panose="02020603050405020304" pitchFamily="18" charset="0"/>
                 <a:sym typeface="Times New Roman" panose="02020603050405020304" pitchFamily="18" charset="0"/>
               </a:rPr>
-              <a:t>	           </a:t>
-            </a:r>
-            <a:r>
-              <a:rPr lang="en-US" altLang="zh-CN" sz="2000" b="1">
+              <a:t>sendBroadcast</a:t>
+            </a:r>
+            <a:r>
+              <a:rPr lang="en-US" altLang="zh-CN" sz="2000" b="1" dirty="0">
                 <a:solidFill>
                   <a:srgbClr val="0070C0"/>
                 </a:solidFill>
                 <a:latin typeface="Times New Roman" panose="02020603050405020304" pitchFamily="18" charset="0"/>
                 <a:sym typeface="Times New Roman" panose="02020603050405020304" pitchFamily="18" charset="0"/>
               </a:rPr>
-              <a:t>sendBroadcast(intent);</a:t>
+              <a:t>(intent);</a:t>
             </a:r>
           </a:p>
           <a:p>
             <a:r>
-              <a:rPr lang="en-US" altLang="zh-CN" sz="2000">
+              <a:rPr lang="en-US" altLang="zh-CN" sz="2000" dirty="0" err="1">
                 <a:solidFill>
                   <a:srgbClr val="000000"/>
                 </a:solidFill>
                 <a:latin typeface="Times New Roman" panose="02020603050405020304" pitchFamily="18" charset="0"/>
                 <a:sym typeface="Times New Roman" panose="02020603050405020304" pitchFamily="18" charset="0"/>
               </a:rPr>
-              <a:t>	           Log.e("BroadcastReceiver","sendbroadcast");</a:t>
+              <a:t>Log.e</a:t>
+            </a:r>
+            <a:r>
+              <a:rPr lang="en-US" altLang="zh-CN" sz="2000" dirty="0">
+                <a:solidFill>
+                  <a:srgbClr val="000000"/>
+                </a:solidFill>
+                <a:latin typeface="Times New Roman" panose="02020603050405020304" pitchFamily="18" charset="0"/>
+                <a:sym typeface="Times New Roman" panose="02020603050405020304" pitchFamily="18" charset="0"/>
+              </a:rPr>
+              <a:t>("</a:t>
+            </a:r>
+            <a:r>
+              <a:rPr lang="en-US" altLang="zh-CN" sz="2000" dirty="0" err="1">
+                <a:solidFill>
+                  <a:srgbClr val="000000"/>
+                </a:solidFill>
+                <a:latin typeface="Times New Roman" panose="02020603050405020304" pitchFamily="18" charset="0"/>
+                <a:sym typeface="Times New Roman" panose="02020603050405020304" pitchFamily="18" charset="0"/>
+              </a:rPr>
+              <a:t>BroadcastReceiver</a:t>
+            </a:r>
+            <a:r>
+              <a:rPr lang="en-US" altLang="zh-CN" sz="2000" dirty="0">
+                <a:solidFill>
+                  <a:srgbClr val="000000"/>
+                </a:solidFill>
+                <a:latin typeface="Times New Roman" panose="02020603050405020304" pitchFamily="18" charset="0"/>
+                <a:sym typeface="Times New Roman" panose="02020603050405020304" pitchFamily="18" charset="0"/>
+              </a:rPr>
+              <a:t>","</a:t>
+            </a:r>
+            <a:r>
+              <a:rPr lang="en-US" altLang="zh-CN" sz="2000" dirty="0" err="1">
+                <a:solidFill>
+                  <a:srgbClr val="000000"/>
+                </a:solidFill>
+                <a:latin typeface="Times New Roman" panose="02020603050405020304" pitchFamily="18" charset="0"/>
+                <a:sym typeface="Times New Roman" panose="02020603050405020304" pitchFamily="18" charset="0"/>
+              </a:rPr>
+              <a:t>sendbroadcast</a:t>
+            </a:r>
+            <a:r>
+              <a:rPr lang="en-US" altLang="zh-CN" sz="2000" dirty="0">
+                <a:solidFill>
+                  <a:srgbClr val="000000"/>
+                </a:solidFill>
+                <a:latin typeface="Times New Roman" panose="02020603050405020304" pitchFamily="18" charset="0"/>
+                <a:sym typeface="Times New Roman" panose="02020603050405020304" pitchFamily="18" charset="0"/>
+              </a:rPr>
+              <a:t>");</a:t>
             </a:r>
           </a:p>
           <a:p>
             <a:r>
-              <a:rPr lang="en-US" altLang="zh-CN" sz="2000">
+              <a:rPr lang="en-US" altLang="zh-CN" sz="2000" dirty="0">
                 <a:solidFill>
                   <a:srgbClr val="000000"/>
                 </a:solidFill>
                 <a:latin typeface="Times New Roman" panose="02020603050405020304" pitchFamily="18" charset="0"/>
                 <a:sym typeface="Times New Roman" panose="02020603050405020304" pitchFamily="18" charset="0"/>
               </a:rPr>
-              <a:t>	         }</a:t>
-            </a:r>
-          </a:p>
-          <a:p>
-            <a:endParaRPr lang="en-US" altLang="zh-CN" sz="1400">
+              <a:t>}</a:t>
+            </a:r>
+            <a:endParaRPr lang="en-US" altLang="zh-CN" sz="1400" dirty="0">
               <a:solidFill>
                 <a:srgbClr val="000000"/>
               </a:solidFill>
@@ -9979,7 +10049,7 @@
         </p:nvSpPr>
         <p:spPr bwMode="auto">
           <a:xfrm>
-            <a:off x="779463" y="855663"/>
+            <a:off x="432295" y="843630"/>
             <a:ext cx="7416800" cy="368300"/>
           </a:xfrm>
           <a:prstGeom prst="rect">
@@ -10016,7 +10086,7 @@
           <a:lstStyle/>
           <a:p>
             <a:r>
-              <a:rPr lang="en-US" altLang="zh-CN">
+              <a:rPr lang="en-US" altLang="zh-CN" dirty="0">
                 <a:solidFill>
                   <a:srgbClr val="000000"/>
                 </a:solidFill>
@@ -10026,7 +10096,7 @@
               <a:t>BroadcastReceiverActivity.java</a:t>
             </a:r>
             <a:r>
-              <a:rPr lang="zh-CN" altLang="en-US" sz="1400">
+              <a:rPr lang="zh-CN" altLang="en-US" sz="1400" dirty="0">
                 <a:solidFill>
                   <a:srgbClr val="000000"/>
                 </a:solidFill>
@@ -10037,7 +10107,7 @@
               <a:t>用来实现</a:t>
             </a:r>
             <a:r>
-              <a:rPr lang="zh-CN" altLang="en-US" sz="1400" b="1">
+              <a:rPr lang="zh-CN" altLang="en-US" sz="1400" b="1" dirty="0">
                 <a:solidFill>
                   <a:srgbClr val="000000"/>
                 </a:solidFill>
@@ -10048,7 +10118,7 @@
               <a:t>接收广播</a:t>
             </a:r>
             <a:r>
-              <a:rPr lang="zh-CN" altLang="en-US" sz="1400">
+              <a:rPr lang="zh-CN" altLang="en-US" sz="1400" dirty="0">
                 <a:solidFill>
                   <a:srgbClr val="000000"/>
                 </a:solidFill>
@@ -10077,38 +10147,23 @@
         </p:nvSpPr>
         <p:spPr bwMode="auto">
           <a:xfrm>
-            <a:off x="250825" y="1495425"/>
-            <a:ext cx="8402638" cy="3290888"/>
+            <a:off x="420777" y="1347665"/>
+            <a:ext cx="8425460" cy="3290888"/>
           </a:xfrm>
           <a:prstGeom prst="rect">
             <a:avLst/>
           </a:prstGeom>
-          <a:noFill/>
+          <a:solidFill>
+            <a:schemeClr val="bg1">
+              <a:lumMod val="85000"/>
+            </a:schemeClr>
+          </a:solidFill>
           <a:ln>
             <a:noFill/>
           </a:ln>
-          <a:extLst>
-            <a:ext uri="{909E8E84-426E-40DD-AFC4-6F175D3DCCD1}">
-              <a14:hiddenFill xmlns:a14="http://schemas.microsoft.com/office/drawing/2010/main">
-                <a:solidFill>
-                  <a:srgbClr val="FFFFFF"/>
-                </a:solidFill>
-              </a14:hiddenFill>
-            </a:ext>
-            <a:ext uri="{91240B29-F687-4F45-9708-019B960494DF}">
-              <a14:hiddenLine xmlns:a14="http://schemas.microsoft.com/office/drawing/2010/main" w="9525">
-                <a:solidFill>
-                  <a:srgbClr val="000000"/>
-                </a:solidFill>
-                <a:miter lim="800000"/>
-                <a:headEnd/>
-                <a:tailEnd/>
-              </a14:hiddenLine>
-            </a:ext>
-          </a:extLst>
         </p:spPr>
         <p:txBody>
-          <a:bodyPr>
+          <a:bodyPr wrap="square">
             <a:spAutoFit/>
           </a:bodyPr>
           <a:lstStyle>
@@ -10217,7 +10272,7 @@
             <a:pPr>
               <a:defRPr/>
             </a:pPr>
-            <a:endParaRPr lang="en-US" altLang="zh-CN" sz="1400">
+            <a:endParaRPr lang="en-US" altLang="zh-CN" sz="1400" dirty="0">
               <a:solidFill>
                 <a:srgbClr val="000000"/>
               </a:solidFill>
@@ -10230,14 +10285,54 @@
               <a:defRPr/>
             </a:pPr>
             <a:r>
-              <a:rPr lang="en-US" altLang="zh-CN" sz="2000">
+              <a:rPr lang="en-US" altLang="zh-CN" sz="2000" dirty="0">
                 <a:solidFill>
                   <a:srgbClr val="000000"/>
                 </a:solidFill>
                 <a:latin typeface="Times New Roman" panose="02020603050405020304" pitchFamily="18" charset="0"/>
                 <a:sym typeface="Times New Roman" panose="02020603050405020304" pitchFamily="18" charset="0"/>
               </a:rPr>
-              <a:t>public class BroadcastReceiverActivity extends BroadcastReceiver {</a:t>
+              <a:t>public class </a:t>
+            </a:r>
+            <a:r>
+              <a:rPr lang="en-US" altLang="zh-CN" sz="2000" dirty="0" err="1">
+                <a:solidFill>
+                  <a:srgbClr val="000000"/>
+                </a:solidFill>
+                <a:latin typeface="Times New Roman" panose="02020603050405020304" pitchFamily="18" charset="0"/>
+                <a:sym typeface="Times New Roman" panose="02020603050405020304" pitchFamily="18" charset="0"/>
+              </a:rPr>
+              <a:t>BroadcastReceiverActivity</a:t>
+            </a:r>
+            <a:r>
+              <a:rPr lang="en-US" altLang="zh-CN" sz="2000" dirty="0">
+                <a:solidFill>
+                  <a:srgbClr val="000000"/>
+                </a:solidFill>
+                <a:latin typeface="Times New Roman" panose="02020603050405020304" pitchFamily="18" charset="0"/>
+                <a:sym typeface="Times New Roman" panose="02020603050405020304" pitchFamily="18" charset="0"/>
+              </a:rPr>
+              <a:t> extends </a:t>
+            </a:r>
+            <a:r>
+              <a:rPr lang="en-US" altLang="zh-CN" sz="2000" dirty="0" err="1">
+                <a:solidFill>
+                  <a:srgbClr val="000000"/>
+                </a:solidFill>
+                <a:latin typeface="Times New Roman" panose="02020603050405020304" pitchFamily="18" charset="0"/>
+                <a:sym typeface="Times New Roman" panose="02020603050405020304" pitchFamily="18" charset="0"/>
+              </a:rPr>
+              <a:t>BroadcastReceiver</a:t>
+            </a:r>
+            <a:r>
+              <a:rPr lang="en-US" altLang="zh-CN" sz="2000" dirty="0">
+                <a:solidFill>
+                  <a:srgbClr val="000000"/>
+                </a:solidFill>
+                <a:latin typeface="Times New Roman" panose="02020603050405020304" pitchFamily="18" charset="0"/>
+                <a:sym typeface="Times New Roman" panose="02020603050405020304" pitchFamily="18" charset="0"/>
+              </a:rPr>
+              <a:t> {</a:t>
             </a:r>
           </a:p>
           <a:p>
@@ -10245,7 +10340,7 @@
               <a:defRPr/>
             </a:pPr>
             <a:r>
-              <a:rPr lang="en-US" altLang="zh-CN" sz="2000">
+              <a:rPr lang="en-US" altLang="zh-CN" sz="2000" dirty="0">
                 <a:solidFill>
                   <a:srgbClr val="000000"/>
                 </a:solidFill>
@@ -10260,7 +10355,7 @@
               <a:defRPr/>
             </a:pPr>
             <a:r>
-              <a:rPr lang="en-US" altLang="zh-CN" sz="2000">
+              <a:rPr lang="en-US" altLang="zh-CN" sz="2000" dirty="0">
                 <a:solidFill>
                   <a:srgbClr val="000000"/>
                 </a:solidFill>
@@ -10270,7 +10365,7 @@
               <a:t>               public void </a:t>
             </a:r>
             <a:r>
-              <a:rPr lang="en-US" altLang="zh-CN" sz="2000" b="1">
+              <a:rPr lang="en-US" altLang="zh-CN" sz="2000" b="1" dirty="0" err="1">
                 <a:solidFill>
                   <a:srgbClr val="0070C0"/>
                 </a:solidFill>
@@ -10280,14 +10375,34 @@
               <a:t>onReceive</a:t>
             </a:r>
             <a:r>
-              <a:rPr lang="en-US" altLang="zh-CN" sz="2000">
+              <a:rPr lang="en-US" altLang="zh-CN" sz="2000" dirty="0">
                 <a:solidFill>
                   <a:srgbClr val="000000"/>
                 </a:solidFill>
                 <a:latin typeface="Times New Roman" panose="02020603050405020304" pitchFamily="18" charset="0"/>
                 <a:sym typeface="Times New Roman" panose="02020603050405020304" pitchFamily="18" charset="0"/>
               </a:rPr>
-              <a:t>(Context context, Intent intent) {</a:t>
+              <a:t>(Context </a:t>
+            </a:r>
+            <a:r>
+              <a:rPr lang="en-US" altLang="zh-CN" sz="2000" dirty="0" err="1">
+                <a:solidFill>
+                  <a:srgbClr val="000000"/>
+                </a:solidFill>
+                <a:latin typeface="Times New Roman" panose="02020603050405020304" pitchFamily="18" charset="0"/>
+                <a:sym typeface="Times New Roman" panose="02020603050405020304" pitchFamily="18" charset="0"/>
+              </a:rPr>
+              <a:t>context</a:t>
+            </a:r>
+            <a:r>
+              <a:rPr lang="en-US" altLang="zh-CN" sz="2000" dirty="0">
+                <a:solidFill>
+                  <a:srgbClr val="000000"/>
+                </a:solidFill>
+                <a:latin typeface="Times New Roman" panose="02020603050405020304" pitchFamily="18" charset="0"/>
+                <a:sym typeface="Times New Roman" panose="02020603050405020304" pitchFamily="18" charset="0"/>
+              </a:rPr>
+              <a:t>, Intent intent) {</a:t>
             </a:r>
           </a:p>
           <a:p>
@@ -10295,7 +10410,7 @@
               <a:defRPr/>
             </a:pPr>
             <a:r>
-              <a:rPr lang="en-US" altLang="zh-CN" sz="2000">
+              <a:rPr lang="en-US" altLang="zh-CN" sz="2000" dirty="0">
                 <a:solidFill>
                   <a:srgbClr val="000000"/>
                 </a:solidFill>
@@ -10310,14 +10425,54 @@
               <a:defRPr/>
             </a:pPr>
             <a:r>
-              <a:rPr lang="en-US" altLang="zh-CN" sz="2000">
+              <a:rPr lang="en-US" altLang="zh-CN" sz="2000" dirty="0">
                 <a:solidFill>
                   <a:srgbClr val="000000"/>
                 </a:solidFill>
                 <a:latin typeface="Times New Roman" panose="02020603050405020304" pitchFamily="18" charset="0"/>
                 <a:sym typeface="Times New Roman" panose="02020603050405020304" pitchFamily="18" charset="0"/>
               </a:rPr>
-              <a:t>	   String Intent_Action = intent.getAction();</a:t>
+              <a:t>	   String </a:t>
+            </a:r>
+            <a:r>
+              <a:rPr lang="en-US" altLang="zh-CN" sz="2000" dirty="0" err="1">
+                <a:solidFill>
+                  <a:srgbClr val="000000"/>
+                </a:solidFill>
+                <a:latin typeface="Times New Roman" panose="02020603050405020304" pitchFamily="18" charset="0"/>
+                <a:sym typeface="Times New Roman" panose="02020603050405020304" pitchFamily="18" charset="0"/>
+              </a:rPr>
+              <a:t>Intent_Action</a:t>
+            </a:r>
+            <a:r>
+              <a:rPr lang="en-US" altLang="zh-CN" sz="2000" dirty="0">
+                <a:solidFill>
+                  <a:srgbClr val="000000"/>
+                </a:solidFill>
+                <a:latin typeface="Times New Roman" panose="02020603050405020304" pitchFamily="18" charset="0"/>
+                <a:sym typeface="Times New Roman" panose="02020603050405020304" pitchFamily="18" charset="0"/>
+              </a:rPr>
+              <a:t> = </a:t>
+            </a:r>
+            <a:r>
+              <a:rPr lang="en-US" altLang="zh-CN" sz="2000" dirty="0" err="1">
+                <a:solidFill>
+                  <a:srgbClr val="000000"/>
+                </a:solidFill>
+                <a:latin typeface="Times New Roman" panose="02020603050405020304" pitchFamily="18" charset="0"/>
+                <a:sym typeface="Times New Roman" panose="02020603050405020304" pitchFamily="18" charset="0"/>
+              </a:rPr>
+              <a:t>intent.getAction</a:t>
+            </a:r>
+            <a:r>
+              <a:rPr lang="en-US" altLang="zh-CN" sz="2000" dirty="0">
+                <a:solidFill>
+                  <a:srgbClr val="000000"/>
+                </a:solidFill>
+                <a:latin typeface="Times New Roman" panose="02020603050405020304" pitchFamily="18" charset="0"/>
+                <a:sym typeface="Times New Roman" panose="02020603050405020304" pitchFamily="18" charset="0"/>
+              </a:rPr>
+              <a:t>();</a:t>
             </a:r>
           </a:p>
           <a:p>
@@ -10325,7 +10480,7 @@
               <a:defRPr/>
             </a:pPr>
             <a:r>
-              <a:rPr lang="en-US" altLang="zh-CN" sz="2000">
+              <a:rPr lang="en-US" altLang="zh-CN" sz="2000" dirty="0">
                 <a:solidFill>
                   <a:srgbClr val="000000"/>
                 </a:solidFill>
@@ -10335,24 +10490,54 @@
               <a:t>	if("</a:t>
             </a:r>
             <a:r>
-              <a:rPr lang="en-US" altLang="zh-CN" sz="2000" b="1">
+              <a:rPr lang="en-US" altLang="zh-CN" sz="2000" b="1" dirty="0">
                 <a:solidFill>
                   <a:srgbClr val="00B050"/>
                 </a:solidFill>
                 <a:latin typeface="Times New Roman" panose="02020603050405020304" pitchFamily="18" charset="0"/>
                 <a:sym typeface="Times New Roman" panose="02020603050405020304" pitchFamily="18" charset="0"/>
               </a:rPr>
-              <a:t>com.android.BroadcastReceiverDemo</a:t>
-            </a:r>
-            <a:r>
-              <a:rPr lang="en-US" altLang="zh-CN" sz="2000">
-                <a:solidFill>
-                  <a:srgbClr val="000000"/>
+              <a:t>com.android.</a:t>
+            </a:r>
+            <a:r>
+              <a:rPr lang="en-US" altLang="zh-CN" sz="2000" b="1" dirty="0" err="1">
+                <a:solidFill>
+                  <a:srgbClr val="00B050"/>
                 </a:solidFill>
                 <a:latin typeface="Times New Roman" panose="02020603050405020304" pitchFamily="18" charset="0"/>
                 <a:sym typeface="Times New Roman" panose="02020603050405020304" pitchFamily="18" charset="0"/>
               </a:rPr>
-              <a:t>".equals(Intent_Action)){</a:t>
+              <a:t>BroadcastReceiverDemo</a:t>
+            </a:r>
+            <a:r>
+              <a:rPr lang="en-US" altLang="zh-CN" sz="2000" dirty="0">
+                <a:solidFill>
+                  <a:srgbClr val="000000"/>
+                </a:solidFill>
+                <a:latin typeface="Times New Roman" panose="02020603050405020304" pitchFamily="18" charset="0"/>
+                <a:sym typeface="Times New Roman" panose="02020603050405020304" pitchFamily="18" charset="0"/>
+              </a:rPr>
+              <a:t>".equals(</a:t>
+            </a:r>
+            <a:r>
+              <a:rPr lang="en-US" altLang="zh-CN" sz="2000" dirty="0" err="1">
+                <a:solidFill>
+                  <a:srgbClr val="000000"/>
+                </a:solidFill>
+                <a:latin typeface="Times New Roman" panose="02020603050405020304" pitchFamily="18" charset="0"/>
+                <a:sym typeface="Times New Roman" panose="02020603050405020304" pitchFamily="18" charset="0"/>
+              </a:rPr>
+              <a:t>Intent_Action</a:t>
+            </a:r>
+            <a:r>
+              <a:rPr lang="en-US" altLang="zh-CN" sz="2000" dirty="0">
+                <a:solidFill>
+                  <a:srgbClr val="000000"/>
+                </a:solidFill>
+                <a:latin typeface="Times New Roman" panose="02020603050405020304" pitchFamily="18" charset="0"/>
+                <a:sym typeface="Times New Roman" panose="02020603050405020304" pitchFamily="18" charset="0"/>
+              </a:rPr>
+              <a:t>)){</a:t>
             </a:r>
           </a:p>
           <a:p>
@@ -10360,14 +10545,74 @@
               <a:defRPr/>
             </a:pPr>
             <a:r>
-              <a:rPr lang="en-US" altLang="zh-CN" sz="2000">
+              <a:rPr lang="en-US" altLang="zh-CN" sz="2000" dirty="0">
                 <a:solidFill>
                   <a:srgbClr val="000000"/>
                 </a:solidFill>
                 <a:latin typeface="Times New Roman" panose="02020603050405020304" pitchFamily="18" charset="0"/>
                 <a:sym typeface="Times New Roman" panose="02020603050405020304" pitchFamily="18" charset="0"/>
               </a:rPr>
-              <a:t>	      Log.e("BroadcastReceiver","onReceive");</a:t>
+              <a:t>	      </a:t>
+            </a:r>
+            <a:r>
+              <a:rPr lang="en-US" altLang="zh-CN" sz="2000" dirty="0" err="1">
+                <a:solidFill>
+                  <a:srgbClr val="000000"/>
+                </a:solidFill>
+                <a:latin typeface="Times New Roman" panose="02020603050405020304" pitchFamily="18" charset="0"/>
+                <a:sym typeface="Times New Roman" panose="02020603050405020304" pitchFamily="18" charset="0"/>
+              </a:rPr>
+              <a:t>Log.e</a:t>
+            </a:r>
+            <a:r>
+              <a:rPr lang="en-US" altLang="zh-CN" sz="2000" dirty="0">
+                <a:solidFill>
+                  <a:srgbClr val="000000"/>
+                </a:solidFill>
+                <a:latin typeface="Times New Roman" panose="02020603050405020304" pitchFamily="18" charset="0"/>
+                <a:sym typeface="Times New Roman" panose="02020603050405020304" pitchFamily="18" charset="0"/>
+              </a:rPr>
+              <a:t>("</a:t>
+            </a:r>
+            <a:r>
+              <a:rPr lang="en-US" altLang="zh-CN" sz="2000" dirty="0" err="1">
+                <a:solidFill>
+                  <a:srgbClr val="000000"/>
+                </a:solidFill>
+                <a:latin typeface="Times New Roman" panose="02020603050405020304" pitchFamily="18" charset="0"/>
+                <a:sym typeface="Times New Roman" panose="02020603050405020304" pitchFamily="18" charset="0"/>
+              </a:rPr>
+              <a:t>BroadcastReceiver</a:t>
+            </a:r>
+            <a:r>
+              <a:rPr lang="en-US" altLang="zh-CN" sz="2000" dirty="0">
+                <a:solidFill>
+                  <a:srgbClr val="000000"/>
+                </a:solidFill>
+                <a:latin typeface="Times New Roman" panose="02020603050405020304" pitchFamily="18" charset="0"/>
+                <a:sym typeface="Times New Roman" panose="02020603050405020304" pitchFamily="18" charset="0"/>
+              </a:rPr>
+              <a:t>","</a:t>
+            </a:r>
+            <a:r>
+              <a:rPr lang="en-US" altLang="zh-CN" sz="2000" dirty="0" err="1">
+                <a:solidFill>
+                  <a:srgbClr val="000000"/>
+                </a:solidFill>
+                <a:latin typeface="Times New Roman" panose="02020603050405020304" pitchFamily="18" charset="0"/>
+                <a:sym typeface="Times New Roman" panose="02020603050405020304" pitchFamily="18" charset="0"/>
+              </a:rPr>
+              <a:t>onReceive</a:t>
+            </a:r>
+            <a:r>
+              <a:rPr lang="en-US" altLang="zh-CN" sz="2000" dirty="0">
+                <a:solidFill>
+                  <a:srgbClr val="000000"/>
+                </a:solidFill>
+                <a:latin typeface="Times New Roman" panose="02020603050405020304" pitchFamily="18" charset="0"/>
+                <a:sym typeface="Times New Roman" panose="02020603050405020304" pitchFamily="18" charset="0"/>
+              </a:rPr>
+              <a:t>");</a:t>
             </a:r>
           </a:p>
           <a:p>
@@ -10375,7 +10620,7 @@
               <a:defRPr/>
             </a:pPr>
             <a:r>
-              <a:rPr lang="en-US" altLang="zh-CN" sz="2000">
+              <a:rPr lang="en-US" altLang="zh-CN" sz="2000" dirty="0">
                 <a:solidFill>
                   <a:srgbClr val="000000"/>
                 </a:solidFill>
@@ -10390,7 +10635,7 @@
               <a:defRPr/>
             </a:pPr>
             <a:r>
-              <a:rPr lang="en-US" altLang="zh-CN" sz="2000">
+              <a:rPr lang="en-US" altLang="zh-CN" sz="2000" dirty="0">
                 <a:solidFill>
                   <a:srgbClr val="000000"/>
                 </a:solidFill>
@@ -10404,7 +10649,7 @@
             <a:pPr indent="266700">
               <a:defRPr/>
             </a:pPr>
-            <a:endParaRPr lang="en-US" altLang="zh-CN" sz="1400">
+            <a:endParaRPr lang="en-US" altLang="zh-CN" sz="1400" dirty="0">
               <a:solidFill>
                 <a:srgbClr val="000000"/>
               </a:solidFill>
@@ -10680,38 +10925,23 @@
         </p:nvSpPr>
         <p:spPr bwMode="auto">
           <a:xfrm>
-            <a:off x="76200" y="1952625"/>
-            <a:ext cx="9013825" cy="2060575"/>
+            <a:off x="179695" y="1952625"/>
+            <a:ext cx="8910330" cy="2060575"/>
           </a:xfrm>
           <a:prstGeom prst="rect">
             <a:avLst/>
           </a:prstGeom>
-          <a:noFill/>
+          <a:solidFill>
+            <a:schemeClr val="bg1">
+              <a:lumMod val="85000"/>
+            </a:schemeClr>
+          </a:solidFill>
           <a:ln>
             <a:noFill/>
           </a:ln>
-          <a:extLst>
-            <a:ext uri="{909E8E84-426E-40DD-AFC4-6F175D3DCCD1}">
-              <a14:hiddenFill xmlns:a14="http://schemas.microsoft.com/office/drawing/2010/main">
-                <a:solidFill>
-                  <a:srgbClr val="FFFFFF"/>
-                </a:solidFill>
-              </a14:hiddenFill>
-            </a:ext>
-            <a:ext uri="{91240B29-F687-4F45-9708-019B960494DF}">
-              <a14:hiddenLine xmlns:a14="http://schemas.microsoft.com/office/drawing/2010/main" w="9525">
-                <a:solidFill>
-                  <a:srgbClr val="000000"/>
-                </a:solidFill>
-                <a:miter lim="800000"/>
-                <a:headEnd/>
-                <a:tailEnd/>
-              </a14:hiddenLine>
-            </a:ext>
-          </a:extLst>
         </p:spPr>
         <p:txBody>
-          <a:bodyPr>
+          <a:bodyPr wrap="square">
             <a:spAutoFit/>
           </a:bodyPr>
           <a:lstStyle>
@@ -10826,7 +11056,7 @@
             </a:lvl9pPr>
           </a:lstStyle>
           <a:p>
-            <a:endParaRPr lang="en-US" altLang="zh-CN" sz="1400">
+            <a:endParaRPr lang="en-US" altLang="zh-CN" sz="1400" dirty="0">
               <a:solidFill>
                 <a:srgbClr val="000000"/>
               </a:solidFill>
@@ -10836,7 +11066,7 @@
           </a:p>
           <a:p>
             <a:r>
-              <a:rPr lang="en-US" altLang="zh-CN" sz="2000">
+              <a:rPr lang="en-US" altLang="zh-CN" sz="2000" dirty="0">
                 <a:solidFill>
                   <a:srgbClr val="000000"/>
                 </a:solidFill>
@@ -10846,7 +11076,7 @@
               <a:t>&lt;</a:t>
             </a:r>
             <a:r>
-              <a:rPr lang="en-US" altLang="zh-CN" sz="2000" b="1">
+              <a:rPr lang="en-US" altLang="zh-CN" sz="2000" b="1" dirty="0">
                 <a:solidFill>
                   <a:srgbClr val="00B050"/>
                 </a:solidFill>
@@ -10856,19 +11086,49 @@
               <a:t>receiver </a:t>
             </a:r>
             <a:r>
-              <a:rPr lang="en-US" altLang="zh-CN" sz="2000">
+              <a:rPr lang="en-US" altLang="zh-CN" sz="2000" dirty="0" err="1">
                 <a:solidFill>
                   <a:srgbClr val="000000"/>
                 </a:solidFill>
                 <a:latin typeface="Times New Roman" panose="02020603050405020304" pitchFamily="18" charset="0"/>
                 <a:sym typeface="Times New Roman" panose="02020603050405020304" pitchFamily="18" charset="0"/>
               </a:rPr>
-              <a:t>android:name=".BroadcastReceiverActivity"&gt;</a:t>
+              <a:t>android:name</a:t>
+            </a:r>
+            <a:r>
+              <a:rPr lang="en-US" altLang="zh-CN" sz="2000" dirty="0">
+                <a:solidFill>
+                  <a:srgbClr val="000000"/>
+                </a:solidFill>
+                <a:latin typeface="Times New Roman" panose="02020603050405020304" pitchFamily="18" charset="0"/>
+                <a:sym typeface="Times New Roman" panose="02020603050405020304" pitchFamily="18" charset="0"/>
+              </a:rPr>
+              <a:t>=".</a:t>
+            </a:r>
+            <a:r>
+              <a:rPr lang="en-US" altLang="zh-CN" sz="2000" dirty="0" err="1">
+                <a:solidFill>
+                  <a:srgbClr val="000000"/>
+                </a:solidFill>
+                <a:latin typeface="Times New Roman" panose="02020603050405020304" pitchFamily="18" charset="0"/>
+                <a:sym typeface="Times New Roman" panose="02020603050405020304" pitchFamily="18" charset="0"/>
+              </a:rPr>
+              <a:t>BroadcastReceiverActivity</a:t>
+            </a:r>
+            <a:r>
+              <a:rPr lang="en-US" altLang="zh-CN" sz="2000" dirty="0">
+                <a:solidFill>
+                  <a:srgbClr val="000000"/>
+                </a:solidFill>
+                <a:latin typeface="Times New Roman" panose="02020603050405020304" pitchFamily="18" charset="0"/>
+                <a:sym typeface="Times New Roman" panose="02020603050405020304" pitchFamily="18" charset="0"/>
+              </a:rPr>
+              <a:t>"&gt;</a:t>
             </a:r>
           </a:p>
           <a:p>
             <a:r>
-              <a:rPr lang="en-US" altLang="zh-CN" sz="2000">
+              <a:rPr lang="en-US" altLang="zh-CN" sz="2000" dirty="0">
                 <a:solidFill>
                   <a:srgbClr val="000000"/>
                 </a:solidFill>
@@ -10880,39 +11140,59 @@
           </a:p>
           <a:p>
             <a:r>
-              <a:rPr lang="en-US" altLang="zh-CN" sz="2000">
+              <a:rPr lang="en-US" altLang="zh-CN" sz="2000" dirty="0">
                 <a:solidFill>
                   <a:srgbClr val="000000"/>
                 </a:solidFill>
                 <a:latin typeface="Times New Roman" panose="02020603050405020304" pitchFamily="18" charset="0"/>
                 <a:sym typeface="Times New Roman" panose="02020603050405020304" pitchFamily="18" charset="0"/>
               </a:rPr>
-              <a:t>	             &lt;action android:name="</a:t>
-            </a:r>
-            <a:r>
-              <a:rPr lang="en-US" altLang="zh-CN" sz="2000" b="1">
-                <a:solidFill>
-                  <a:srgbClr val="00B050"/>
+              <a:t>	             &lt;action </a:t>
+            </a:r>
+            <a:r>
+              <a:rPr lang="en-US" altLang="zh-CN" sz="2000" dirty="0" err="1">
+                <a:solidFill>
+                  <a:srgbClr val="000000"/>
                 </a:solidFill>
                 <a:latin typeface="Times New Roman" panose="02020603050405020304" pitchFamily="18" charset="0"/>
                 <a:sym typeface="Times New Roman" panose="02020603050405020304" pitchFamily="18" charset="0"/>
               </a:rPr>
-              <a:t>com.android.BroadcastReceiverDemo</a:t>
-            </a:r>
-            <a:r>
-              <a:rPr lang="en-US" altLang="zh-CN" sz="2000">
+              <a:t>android:name</a:t>
+            </a:r>
+            <a:r>
+              <a:rPr lang="en-US" altLang="zh-CN" sz="2000" dirty="0">
                 <a:solidFill>
                   <a:srgbClr val="000000"/>
                 </a:solidFill>
                 <a:latin typeface="Times New Roman" panose="02020603050405020304" pitchFamily="18" charset="0"/>
                 <a:sym typeface="Times New Roman" panose="02020603050405020304" pitchFamily="18" charset="0"/>
               </a:rPr>
+              <a:t>="</a:t>
+            </a:r>
+            <a:r>
+              <a:rPr lang="en-US" altLang="zh-CN" sz="2000" b="1" dirty="0" err="1">
+                <a:solidFill>
+                  <a:srgbClr val="00B050"/>
+                </a:solidFill>
+                <a:latin typeface="Times New Roman" panose="02020603050405020304" pitchFamily="18" charset="0"/>
+                <a:sym typeface="Times New Roman" panose="02020603050405020304" pitchFamily="18" charset="0"/>
+              </a:rPr>
+              <a:t>com.android.BroadcastReceiverDemo</a:t>
+            </a:r>
+            <a:r>
+              <a:rPr lang="en-US" altLang="zh-CN" sz="2000" dirty="0">
+                <a:solidFill>
+                  <a:srgbClr val="000000"/>
+                </a:solidFill>
+                <a:latin typeface="Times New Roman" panose="02020603050405020304" pitchFamily="18" charset="0"/>
+                <a:sym typeface="Times New Roman" panose="02020603050405020304" pitchFamily="18" charset="0"/>
+              </a:rPr>
               <a:t>"/&gt;</a:t>
             </a:r>
           </a:p>
           <a:p>
             <a:r>
-              <a:rPr lang="en-US" altLang="zh-CN" sz="2000">
+              <a:rPr lang="en-US" altLang="zh-CN" sz="2000" dirty="0">
                 <a:solidFill>
                   <a:srgbClr val="000000"/>
                 </a:solidFill>
@@ -10924,7 +11204,7 @@
           </a:p>
           <a:p>
             <a:r>
-              <a:rPr lang="en-US" altLang="zh-CN" sz="2000">
+              <a:rPr lang="en-US" altLang="zh-CN" sz="2000" dirty="0">
                 <a:solidFill>
                   <a:srgbClr val="000000"/>
                 </a:solidFill>
@@ -10934,7 +11214,7 @@
               <a:t>&lt;/</a:t>
             </a:r>
             <a:r>
-              <a:rPr lang="en-US" altLang="zh-CN" sz="2000" b="1">
+              <a:rPr lang="en-US" altLang="zh-CN" sz="2000" b="1" dirty="0">
                 <a:solidFill>
                   <a:srgbClr val="00B050"/>
                 </a:solidFill>
@@ -10944,7 +11224,7 @@
               <a:t>receiver</a:t>
             </a:r>
             <a:r>
-              <a:rPr lang="en-US" altLang="zh-CN" sz="2000">
+              <a:rPr lang="en-US" altLang="zh-CN" sz="2000" dirty="0">
                 <a:solidFill>
                   <a:srgbClr val="000000"/>
                 </a:solidFill>
@@ -10955,7 +11235,7 @@
             </a:r>
           </a:p>
           <a:p>
-            <a:endParaRPr lang="en-US" altLang="zh-CN" sz="1400">
+            <a:endParaRPr lang="en-US" altLang="zh-CN" sz="1400" dirty="0">
               <a:solidFill>
                 <a:srgbClr val="000000"/>
               </a:solidFill>
@@ -11070,7 +11350,7 @@
         </p:nvGraphicFramePr>
         <p:xfrm>
           <a:off x="92075" y="1038225"/>
-          <a:ext cx="8961438" cy="3068638"/>
+          <a:ext cx="8961438" cy="3068739"/>
         </p:xfrm>
         <a:graphic>
           <a:graphicData uri="http://schemas.openxmlformats.org/drawingml/2006/table">
@@ -19175,7 +19455,7 @@
                         <a:buNone/>
                       </a:pPr>
                       <a:r>
-                        <a:rPr kumimoji="0" lang="en-US" altLang="zh-CN" sz="1200" b="0" i="0" u="none" strike="noStrike" cap="none" normalizeH="0" baseline="0">
+                        <a:rPr kumimoji="0" lang="en-US" altLang="zh-CN" sz="1200" b="0" i="0" u="none" strike="noStrike" cap="none" normalizeH="0" baseline="0" dirty="0" err="1">
                           <a:ln>
                             <a:noFill/>
                           </a:ln>
@@ -19189,6 +19469,18 @@
                         </a:rPr>
                         <a:t>android.provider.Telephony.SMS_RECEIVED</a:t>
                       </a:r>
+                      <a:endParaRPr kumimoji="0" lang="en-US" altLang="zh-CN" sz="1200" b="0" i="0" u="none" strike="noStrike" cap="none" normalizeH="0" baseline="0" dirty="0">
+                        <a:ln>
+                          <a:noFill/>
+                        </a:ln>
+                        <a:solidFill>
+                          <a:schemeClr val="tx1"/>
+                        </a:solidFill>
+                        <a:effectLst/>
+                        <a:latin typeface="Times New Roman" panose="02020603050405020304" pitchFamily="18" charset="0"/>
+                        <a:ea typeface="宋体" panose="02010600030101010101" pitchFamily="2" charset="-122"/>
+                        <a:sym typeface="Times New Roman" panose="02020603050405020304" pitchFamily="18" charset="0"/>
+                      </a:endParaRPr>
                     </a:p>
                   </a:txBody>
                   <a:tcPr marL="68582" marR="68582" marT="0" marB="0" horzOverflow="overflow">
@@ -20267,7 +20559,7 @@
                         <a:buNone/>
                       </a:pPr>
                       <a:r>
-                        <a:rPr kumimoji="0" lang="zh-CN" altLang="en-US" sz="1200" b="1" i="0" u="none" strike="noStrike" cap="none" normalizeH="0" baseline="0">
+                        <a:rPr kumimoji="0" lang="zh-CN" altLang="en-US" sz="1200" b="1" i="0" u="none" strike="noStrike" cap="none" normalizeH="0" baseline="0" dirty="0">
                           <a:ln>
                             <a:noFill/>
                           </a:ln>
@@ -20618,27 +20910,14 @@
           <a:prstGeom prst="rect">
             <a:avLst/>
           </a:prstGeom>
-          <a:noFill/>
+          <a:solidFill>
+            <a:schemeClr val="bg1">
+              <a:lumMod val="85000"/>
+            </a:schemeClr>
+          </a:solidFill>
           <a:ln>
             <a:noFill/>
           </a:ln>
-          <a:extLst>
-            <a:ext uri="{909E8E84-426E-40DD-AFC4-6F175D3DCCD1}">
-              <a14:hiddenFill xmlns:a14="http://schemas.microsoft.com/office/drawing/2010/main">
-                <a:solidFill>
-                  <a:srgbClr val="FFFFFF"/>
-                </a:solidFill>
-              </a14:hiddenFill>
-            </a:ext>
-            <a:ext uri="{91240B29-F687-4F45-9708-019B960494DF}">
-              <a14:hiddenLine xmlns:a14="http://schemas.microsoft.com/office/drawing/2010/main" w="9525">
-                <a:solidFill>
-                  <a:srgbClr val="000000"/>
-                </a:solidFill>
-                <a:bevel/>
-              </a14:hiddenLine>
-            </a:ext>
-          </a:extLst>
         </p:spPr>
         <p:txBody>
           <a:bodyPr>
@@ -20901,35 +21180,20 @@
         </p:nvSpPr>
         <p:spPr bwMode="auto">
           <a:xfrm>
-            <a:off x="149225" y="3384550"/>
+            <a:off x="214746" y="3363805"/>
             <a:ext cx="5865813" cy="920750"/>
           </a:xfrm>
           <a:prstGeom prst="rect">
             <a:avLst/>
           </a:prstGeom>
-          <a:noFill/>
+          <a:solidFill>
+            <a:schemeClr val="bg1">
+              <a:lumMod val="85000"/>
+            </a:schemeClr>
+          </a:solidFill>
           <a:ln>
             <a:noFill/>
           </a:ln>
-          <a:extLst>
-            <a:ext uri="{909E8E84-426E-40DD-AFC4-6F175D3DCCD1}">
-              <a14:hiddenFill xmlns:a14="http://schemas.microsoft.com/office/drawing/2010/main">
-                <a:solidFill>
-                  <a:srgbClr val="FFFFFF"/>
-                </a:solidFill>
-              </a14:hiddenFill>
-            </a:ext>
-            <a:ext uri="{91240B29-F687-4F45-9708-019B960494DF}">
-              <a14:hiddenLine xmlns:a14="http://schemas.microsoft.com/office/drawing/2010/main" w="9525">
-                <a:solidFill>
-                  <a:srgbClr val="000000"/>
-                </a:solidFill>
-                <a:miter lim="800000"/>
-                <a:headEnd/>
-                <a:tailEnd/>
-              </a14:hiddenLine>
-            </a:ext>
-          </a:extLst>
         </p:spPr>
         <p:txBody>
           <a:bodyPr>
@@ -21214,36 +21478,23 @@
         </p:nvSpPr>
         <p:spPr bwMode="auto">
           <a:xfrm>
-            <a:off x="196850" y="533400"/>
-            <a:ext cx="4776788" cy="1014413"/>
+            <a:off x="474380" y="1239097"/>
+            <a:ext cx="5394518" cy="943528"/>
           </a:xfrm>
           <a:prstGeom prst="rect">
             <a:avLst/>
           </a:prstGeom>
-          <a:noFill/>
+          <a:solidFill>
+            <a:schemeClr val="bg1">
+              <a:lumMod val="85000"/>
+            </a:schemeClr>
+          </a:solidFill>
           <a:ln>
             <a:noFill/>
           </a:ln>
-          <a:extLst>
-            <a:ext uri="{909E8E84-426E-40DD-AFC4-6F175D3DCCD1}">
-              <a14:hiddenFill xmlns:a14="http://schemas.microsoft.com/office/drawing/2010/main">
-                <a:solidFill>
-                  <a:srgbClr val="FFFFFF"/>
-                </a:solidFill>
-              </a14:hiddenFill>
-            </a:ext>
-            <a:ext uri="{91240B29-F687-4F45-9708-019B960494DF}">
-              <a14:hiddenLine xmlns:a14="http://schemas.microsoft.com/office/drawing/2010/main" w="9525">
-                <a:solidFill>
-                  <a:srgbClr val="000000"/>
-                </a:solidFill>
-                <a:bevel/>
-              </a14:hiddenLine>
-            </a:ext>
-          </a:extLst>
         </p:spPr>
         <p:txBody>
-          <a:bodyPr wrap="none" anchor="ctr">
+          <a:bodyPr wrap="square" anchor="ctr">
             <a:spAutoFit/>
           </a:bodyPr>
           <a:lstStyle>
@@ -21435,16 +21686,24 @@
           <p:cNvGraphicFramePr>
             <a:graphicFrameLocks noGrp="1"/>
           </p:cNvGraphicFramePr>
-          <p:nvPr/>
+          <p:nvPr>
+            <p:extLst>
+              <p:ext uri="{D42A27DB-BD31-4B8C-83A1-F6EECF244321}">
+                <p14:modId xmlns:p14="http://schemas.microsoft.com/office/powerpoint/2010/main" val="3197679383"/>
+              </p:ext>
+            </p:extLst>
+          </p:nvPr>
         </p:nvGraphicFramePr>
         <p:xfrm>
-          <a:off x="539750" y="1763713"/>
+          <a:off x="457110" y="2643755"/>
           <a:ext cx="5411788" cy="500062"/>
         </p:xfrm>
         <a:graphic>
           <a:graphicData uri="http://schemas.openxmlformats.org/drawingml/2006/table">
             <a:tbl>
-              <a:tblPr/>
+              <a:tblPr>
+                <a:effectLst/>
+              </a:tblPr>
               <a:tblGrid>
                 <a:gridCol w="5411788">
                   <a:extLst>
@@ -21785,7 +22044,11 @@
                     <a:lnBlToTr>
                       <a:noFill/>
                     </a:lnBlToTr>
-                    <a:noFill/>
+                    <a:solidFill>
+                      <a:schemeClr val="bg1">
+                        <a:lumMod val="85000"/>
+                      </a:schemeClr>
+                    </a:solidFill>
                   </a:tcPr>
                 </a:tc>
                 <a:extLst>
@@ -21827,8 +22090,8 @@
         </p:blipFill>
         <p:spPr bwMode="auto">
           <a:xfrm>
-            <a:off x="6162675" y="79375"/>
-            <a:ext cx="2882900" cy="5137150"/>
+            <a:off x="6372125" y="699620"/>
+            <a:ext cx="2373194" cy="4228885"/>
           </a:xfrm>
           <a:prstGeom prst="rect">
             <a:avLst/>
@@ -21874,38 +22137,23 @@
         </p:nvSpPr>
         <p:spPr bwMode="auto">
           <a:xfrm>
-            <a:off x="612775" y="2863850"/>
-            <a:ext cx="5411788" cy="920750"/>
+            <a:off x="457110" y="3946728"/>
+            <a:ext cx="5494427" cy="920750"/>
           </a:xfrm>
           <a:prstGeom prst="rect">
             <a:avLst/>
           </a:prstGeom>
-          <a:noFill/>
+          <a:solidFill>
+            <a:schemeClr val="bg1">
+              <a:lumMod val="85000"/>
+            </a:schemeClr>
+          </a:solidFill>
           <a:ln>
             <a:noFill/>
           </a:ln>
-          <a:extLst>
-            <a:ext uri="{909E8E84-426E-40DD-AFC4-6F175D3DCCD1}">
-              <a14:hiddenFill xmlns:a14="http://schemas.microsoft.com/office/drawing/2010/main">
-                <a:solidFill>
-                  <a:srgbClr val="FFFFFF"/>
-                </a:solidFill>
-              </a14:hiddenFill>
-            </a:ext>
-            <a:ext uri="{91240B29-F687-4F45-9708-019B960494DF}">
-              <a14:hiddenLine xmlns:a14="http://schemas.microsoft.com/office/drawing/2010/main" w="9525">
-                <a:solidFill>
-                  <a:srgbClr val="000000"/>
-                </a:solidFill>
-                <a:miter lim="800000"/>
-                <a:headEnd/>
-                <a:tailEnd/>
-              </a14:hiddenLine>
-            </a:ext>
-          </a:extLst>
         </p:spPr>
         <p:txBody>
-          <a:bodyPr>
+          <a:bodyPr wrap="square">
             <a:spAutoFit/>
           </a:bodyPr>
           <a:lstStyle>
@@ -22025,7 +22273,7 @@
               <a:buAutoNum type="arabicPeriod"/>
             </a:pPr>
             <a:r>
-              <a:rPr lang="zh-CN" altLang="en-US"/>
+              <a:rPr lang="zh-CN" altLang="en-US" dirty="0"/>
               <a:t>创建一个自己的广播</a:t>
             </a:r>
           </a:p>
@@ -22035,7 +22283,7 @@
               <a:buAutoNum type="arabicPeriod"/>
             </a:pPr>
             <a:r>
-              <a:rPr lang="zh-CN" altLang="en-US"/>
+              <a:rPr lang="zh-CN" altLang="en-US" dirty="0"/>
               <a:t>新建一个广播接收器，来接收自己发送的广播</a:t>
             </a:r>
           </a:p>
@@ -22045,7 +22293,7 @@
               <a:buAutoNum type="arabicPeriod"/>
             </a:pPr>
             <a:r>
-              <a:rPr lang="zh-CN" altLang="en-US"/>
+              <a:rPr lang="zh-CN" altLang="en-US" dirty="0"/>
               <a:t>注册广播接收器</a:t>
             </a:r>
           </a:p>
@@ -22801,29 +23049,14 @@
           <a:prstGeom prst="rect">
             <a:avLst/>
           </a:prstGeom>
-          <a:noFill/>
+          <a:solidFill>
+            <a:schemeClr val="bg1">
+              <a:lumMod val="85000"/>
+            </a:schemeClr>
+          </a:solidFill>
           <a:ln>
             <a:noFill/>
           </a:ln>
-          <a:extLst>
-            <a:ext uri="{909E8E84-426E-40DD-AFC4-6F175D3DCCD1}">
-              <a14:hiddenFill xmlns:a14="http://schemas.microsoft.com/office/drawing/2010/main">
-                <a:solidFill>
-                  <a:srgbClr val="FFFFFF"/>
-                </a:solidFill>
-              </a14:hiddenFill>
-            </a:ext>
-            <a:ext uri="{91240B29-F687-4F45-9708-019B960494DF}">
-              <a14:hiddenLine xmlns:a14="http://schemas.microsoft.com/office/drawing/2010/main" w="9525">
-                <a:solidFill>
-                  <a:srgbClr val="000000"/>
-                </a:solidFill>
-                <a:miter lim="800000"/>
-                <a:headEnd/>
-                <a:tailEnd/>
-              </a14:hiddenLine>
-            </a:ext>
-          </a:extLst>
         </p:spPr>
         <p:txBody>
           <a:bodyPr>
@@ -23004,10 +23237,13 @@
               <a:defRPr/>
             </a:pPr>
             <a:r>
-              <a:rPr dirty="0">
+              <a:rPr b="1" dirty="0">
                 <a:solidFill>
                   <a:srgbClr val="000000"/>
                 </a:solidFill>
+                <a:highlight>
+                  <a:srgbClr val="FFFF00"/>
+                </a:highlight>
                 <a:sym typeface="微软雅黑" panose="020B0503020204020204" pitchFamily="34" charset="-122"/>
               </a:rPr>
               <a:t>用于监听 / 接收 应用发出的广播消息，并做出响应</a:t>
@@ -23109,7 +23345,25 @@
                 </a:solidFill>
                 <a:sym typeface="微软雅黑" panose="020B0503020204020204" pitchFamily="34" charset="-122"/>
               </a:rPr>
-              <a:t>如当电话呼入时、网络可用时</a:t>
+              <a:t>如</a:t>
+            </a:r>
+            <a:r>
+              <a:rPr lang="zh-CN" altLang="en-US" dirty="0">
+                <a:solidFill>
+                  <a:srgbClr val="000000"/>
+                </a:solidFill>
+                <a:sym typeface="微软雅黑" panose="020B0503020204020204" pitchFamily="34" charset="-122"/>
+              </a:rPr>
+              <a:t>：</a:t>
+            </a:r>
+            <a:r>
+              <a:rPr dirty="0" err="1">
+                <a:solidFill>
+                  <a:srgbClr val="000000"/>
+                </a:solidFill>
+                <a:sym typeface="微软雅黑" panose="020B0503020204020204" pitchFamily="34" charset="-122"/>
+              </a:rPr>
+              <a:t>当电话呼入时、网络可用时</a:t>
             </a:r>
             <a:r>
               <a:rPr lang="zh-CN" dirty="0">
@@ -23244,7 +23498,7 @@
             </a:extLst>
           </p:cNvPr>
           <p:cNvPicPr>
-            <a:picLocks noChangeAspect="1" noChangeArrowheads="1"/>
+            <a:picLocks noGrp="1" noChangeAspect="1" noChangeArrowheads="1"/>
           </p:cNvPicPr>
           <p:nvPr>
             <p:ph sz="half" idx="2"/>
@@ -23265,8 +23519,8 @@
         </p:blipFill>
         <p:spPr bwMode="auto">
           <a:xfrm>
-            <a:off x="9525" y="1038225"/>
-            <a:ext cx="8901113" cy="1693863"/>
+            <a:off x="785195" y="857780"/>
+            <a:ext cx="6434605" cy="1224492"/>
           </a:xfrm>
           <a:noFill/>
           <a:extLst>
@@ -23339,38 +23593,23 @@
         </p:nvSpPr>
         <p:spPr bwMode="auto">
           <a:xfrm>
-            <a:off x="787400" y="3155950"/>
-            <a:ext cx="5969000" cy="922338"/>
+            <a:off x="786056" y="2600060"/>
+            <a:ext cx="6433743" cy="922338"/>
           </a:xfrm>
           <a:prstGeom prst="rect">
             <a:avLst/>
           </a:prstGeom>
-          <a:noFill/>
+          <a:solidFill>
+            <a:schemeClr val="bg1">
+              <a:lumMod val="85000"/>
+            </a:schemeClr>
+          </a:solidFill>
           <a:ln>
             <a:noFill/>
           </a:ln>
-          <a:extLst>
-            <a:ext uri="{909E8E84-426E-40DD-AFC4-6F175D3DCCD1}">
-              <a14:hiddenFill xmlns:a14="http://schemas.microsoft.com/office/drawing/2010/main">
-                <a:solidFill>
-                  <a:srgbClr val="FFFFFF"/>
-                </a:solidFill>
-              </a14:hiddenFill>
-            </a:ext>
-            <a:ext uri="{91240B29-F687-4F45-9708-019B960494DF}">
-              <a14:hiddenLine xmlns:a14="http://schemas.microsoft.com/office/drawing/2010/main" w="9525">
-                <a:solidFill>
-                  <a:srgbClr val="000000"/>
-                </a:solidFill>
-                <a:miter lim="800000"/>
-                <a:headEnd/>
-                <a:tailEnd/>
-              </a14:hiddenLine>
-            </a:ext>
-          </a:extLst>
         </p:spPr>
         <p:txBody>
-          <a:bodyPr>
+          <a:bodyPr wrap="square">
             <a:spAutoFit/>
           </a:bodyPr>
           <a:lstStyle>
@@ -23490,7 +23729,7 @@
               <a:buChar char=""/>
             </a:pPr>
             <a:r>
-              <a:rPr lang="zh-CN" altLang="en-US"/>
+              <a:rPr lang="zh-CN" altLang="en-US" dirty="0"/>
               <a:t>消息订阅者（广播接收者）</a:t>
             </a:r>
           </a:p>
@@ -23500,7 +23739,7 @@
               <a:buChar char=""/>
             </a:pPr>
             <a:r>
-              <a:rPr lang="zh-CN" altLang="en-US"/>
+              <a:rPr lang="zh-CN" altLang="en-US" dirty="0"/>
               <a:t>消息发布者（广播发布者）</a:t>
             </a:r>
           </a:p>
@@ -23510,7 +23749,7 @@
               <a:buChar char=""/>
             </a:pPr>
             <a:r>
-              <a:rPr lang="zh-CN" altLang="en-US"/>
+              <a:rPr lang="zh-CN" altLang="en-US" dirty="0"/>
               <a:t>消息中心（AMS，即Activity Manager Service）</a:t>
             </a:r>
           </a:p>
@@ -23532,53 +23771,45 @@
         </p:nvSpPr>
         <p:spPr bwMode="auto">
           <a:xfrm>
-            <a:off x="268288" y="4673600"/>
-            <a:ext cx="8383587" cy="244475"/>
+            <a:off x="785195" y="3885610"/>
+            <a:ext cx="6433743" cy="400110"/>
           </a:xfrm>
           <a:prstGeom prst="rect">
             <a:avLst/>
           </a:prstGeom>
-          <a:noFill/>
+          <a:solidFill>
+            <a:schemeClr val="bg1">
+              <a:lumMod val="85000"/>
+            </a:schemeClr>
+          </a:solidFill>
           <a:ln>
             <a:noFill/>
           </a:ln>
-          <a:extLst>
-            <a:ext uri="{909E8E84-426E-40DD-AFC4-6F175D3DCCD1}">
-              <a14:hiddenFill xmlns:a14="http://schemas.microsoft.com/office/drawing/2010/main">
-                <a:solidFill>
-                  <a:srgbClr val="FFFFFF"/>
-                </a:solidFill>
-              </a14:hiddenFill>
-            </a:ext>
-            <a:ext uri="{91240B29-F687-4F45-9708-019B960494DF}">
-              <a14:hiddenLine xmlns:a14="http://schemas.microsoft.com/office/drawing/2010/main" w="9525">
-                <a:solidFill>
-                  <a:srgbClr val="000000"/>
-                </a:solidFill>
-                <a:miter lim="800000"/>
-                <a:headEnd/>
-                <a:tailEnd/>
-              </a14:hiddenLine>
-            </a:ext>
-          </a:extLst>
         </p:spPr>
         <p:txBody>
-          <a:bodyPr>
+          <a:bodyPr wrap="square">
             <a:spAutoFit/>
           </a:bodyPr>
           <a:lstStyle/>
           <a:p>
             <a:r>
-              <a:rPr lang="zh-CN" altLang="en-US" sz="1000" b="1"/>
+              <a:rPr lang="zh-CN" altLang="en-US" sz="1000" b="1" dirty="0"/>
               <a:t>特别注意：广播发送者 和 广播接收者的执行是</a:t>
             </a:r>
             <a:r>
-              <a:rPr lang="zh-CN" altLang="en-US" sz="1000" b="1" u="sng"/>
+              <a:rPr lang="zh-CN" altLang="en-US" sz="1000" b="1" u="sng" dirty="0"/>
               <a:t>异步</a:t>
             </a:r>
             <a:r>
-              <a:rPr lang="zh-CN" altLang="en-US" sz="1000" b="1"/>
-              <a:t>的，发出去的广播不会关心有无接收者接收，也不确定接收者到底是何时才能接收到。</a:t>
+              <a:rPr lang="zh-CN" altLang="en-US" sz="1000" b="1" dirty="0"/>
+              <a:t>的。</a:t>
+            </a:r>
+            <a:endParaRPr lang="en-US" altLang="zh-CN" sz="1000" b="1" dirty="0"/>
+          </a:p>
+          <a:p>
+            <a:r>
+              <a:rPr lang="zh-CN" altLang="en-US" sz="1000" b="1" dirty="0"/>
+              <a:t>发出去的广播不会关心有无接收者接收，也不确定接收者到底是何时才能接收到。</a:t>
             </a:r>
           </a:p>
         </p:txBody>
@@ -23645,7 +23876,7 @@
             <a:r>
               <a:rPr lang="en-US" altLang="zh-CN" noProof="1">
                 <a:solidFill>
-                  <a:srgbClr val="000000"/>
+                  <a:schemeClr val="bg2"/>
                 </a:solidFill>
                 <a:latin typeface="微软雅黑" panose="020B0503020204020204" pitchFamily="34" charset="-122"/>
                 <a:ea typeface="微软雅黑" panose="020B0503020204020204" pitchFamily="34" charset="-122"/>
@@ -23656,7 +23887,7 @@
             <a:r>
               <a:rPr lang="zh-CN" altLang="en-US" noProof="1">
                 <a:solidFill>
-                  <a:srgbClr val="000000"/>
+                  <a:schemeClr val="bg2"/>
                 </a:solidFill>
                 <a:latin typeface="微软雅黑" panose="020B0503020204020204" pitchFamily="34" charset="-122"/>
                 <a:ea typeface="微软雅黑" panose="020B0503020204020204" pitchFamily="34" charset="-122"/>
@@ -23667,7 +23898,7 @@
             <a:r>
               <a:rPr lang="en-US" altLang="zh-CN" noProof="1">
                 <a:solidFill>
-                  <a:srgbClr val="000000"/>
+                  <a:schemeClr val="bg2"/>
                 </a:solidFill>
                 <a:latin typeface="微软雅黑" panose="020B0503020204020204" pitchFamily="34" charset="-122"/>
                 <a:ea typeface="微软雅黑" panose="020B0503020204020204" pitchFamily="34" charset="-122"/>
@@ -23678,7 +23909,7 @@
             <a:r>
               <a:rPr lang="zh-CN" altLang="en-US" dirty="0">
                 <a:solidFill>
-                  <a:srgbClr val="000000"/>
+                  <a:schemeClr val="bg2"/>
                 </a:solidFill>
                 <a:latin typeface="+mn-ea"/>
                 <a:ea typeface="+mn-ea"/>
@@ -23689,7 +23920,7 @@
             <a:r>
               <a:rPr lang="en-US" altLang="zh-CN" dirty="0">
                 <a:solidFill>
-                  <a:srgbClr val="000000"/>
+                  <a:schemeClr val="bg2"/>
                 </a:solidFill>
                 <a:latin typeface="+mn-ea"/>
                 <a:ea typeface="+mn-ea"/>
@@ -23700,7 +23931,7 @@
             <a:r>
               <a:rPr lang="zh-CN" altLang="en-US" dirty="0">
                 <a:solidFill>
-                  <a:srgbClr val="000000"/>
+                  <a:schemeClr val="bg2"/>
                 </a:solidFill>
                 <a:latin typeface="+mn-ea"/>
                 <a:ea typeface="+mn-ea"/>
@@ -23710,7 +23941,7 @@
             </a:r>
             <a:endParaRPr lang="en-US" altLang="zh-CN" noProof="1">
               <a:solidFill>
-                <a:srgbClr val="000000"/>
+                <a:schemeClr val="bg2"/>
               </a:solidFill>
               <a:latin typeface="微软雅黑" panose="020B0503020204020204" pitchFamily="34" charset="-122"/>
               <a:ea typeface="微软雅黑" panose="020B0503020204020204" pitchFamily="34" charset="-122"/>
@@ -23795,44 +24026,29 @@
         </p:nvSpPr>
         <p:spPr bwMode="auto">
           <a:xfrm>
-            <a:off x="323850" y="846138"/>
-            <a:ext cx="8566150" cy="4614862"/>
+            <a:off x="755807" y="1203655"/>
+            <a:ext cx="7632385" cy="3231654"/>
           </a:xfrm>
           <a:prstGeom prst="rect">
             <a:avLst/>
           </a:prstGeom>
-          <a:noFill/>
+          <a:solidFill>
+            <a:schemeClr val="bg1">
+              <a:lumMod val="85000"/>
+            </a:schemeClr>
+          </a:solidFill>
           <a:ln>
             <a:noFill/>
           </a:ln>
-          <a:extLst>
-            <a:ext uri="{909E8E84-426E-40DD-AFC4-6F175D3DCCD1}">
-              <a14:hiddenFill xmlns:a14="http://schemas.microsoft.com/office/drawing/2010/main">
-                <a:solidFill>
-                  <a:srgbClr val="FFFFFF"/>
-                </a:solidFill>
-              </a14:hiddenFill>
-            </a:ext>
-            <a:ext uri="{91240B29-F687-4F45-9708-019B960494DF}">
-              <a14:hiddenLine xmlns:a14="http://schemas.microsoft.com/office/drawing/2010/main" w="9525">
-                <a:solidFill>
-                  <a:srgbClr val="000000"/>
-                </a:solidFill>
-                <a:miter lim="800000"/>
-                <a:headEnd/>
-                <a:tailEnd/>
-              </a14:hiddenLine>
-            </a:ext>
-          </a:extLst>
         </p:spPr>
         <p:txBody>
-          <a:bodyPr>
+          <a:bodyPr wrap="square">
             <a:spAutoFit/>
           </a:bodyPr>
           <a:lstStyle/>
           <a:p>
             <a:r>
-              <a:rPr lang="zh-CN" altLang="en-US" sz="2000" b="1">
+              <a:rPr lang="zh-CN" altLang="en-US" sz="2000" b="1" dirty="0">
                 <a:solidFill>
                   <a:srgbClr val="00B050"/>
                 </a:solidFill>
@@ -23840,7 +24056,7 @@
               <a:t>1、 普通广播：</a:t>
             </a:r>
             <a:r>
-              <a:rPr lang="zh-CN" altLang="en-US" sz="2000" b="1">
+              <a:rPr lang="zh-CN" altLang="en-US" sz="2000" b="1" dirty="0">
                 <a:solidFill>
                   <a:srgbClr val="00B050"/>
                 </a:solidFill>
@@ -23848,7 +24064,7 @@
               </a:rPr>
               <a:t>sendBroadcast</a:t>
             </a:r>
-            <a:endParaRPr lang="en-US" altLang="zh-CN" sz="2000" b="1">
+            <a:endParaRPr lang="en-US" altLang="zh-CN" sz="2000" b="1" dirty="0">
               <a:solidFill>
                 <a:srgbClr val="00B050"/>
               </a:solidFill>
@@ -23859,26 +24075,26 @@
           </a:p>
           <a:p>
             <a:r>
-              <a:rPr lang="en-US" altLang="zh-CN"/>
+              <a:rPr lang="en-US" altLang="zh-CN" dirty="0"/>
               <a:t>	</a:t>
             </a:r>
           </a:p>
           <a:p>
             <a:r>
-              <a:rPr lang="en-US" altLang="zh-CN"/>
+              <a:rPr lang="en-US" altLang="zh-CN" dirty="0"/>
               <a:t>	</a:t>
             </a:r>
             <a:r>
-              <a:rPr lang="zh-CN" altLang="en-US"/>
+              <a:rPr lang="zh-CN" altLang="en-US" dirty="0"/>
               <a:t>依次传递</a:t>
             </a:r>
           </a:p>
           <a:p>
-            <a:endParaRPr lang="zh-CN" altLang="en-US"/>
+            <a:endParaRPr lang="zh-CN" altLang="en-US" dirty="0"/>
           </a:p>
           <a:p>
             <a:r>
-              <a:rPr lang="zh-CN" altLang="en-US" sz="2000" b="1">
+              <a:rPr lang="zh-CN" altLang="en-US" sz="2000" b="1" dirty="0">
                 <a:solidFill>
                   <a:srgbClr val="00B050"/>
                 </a:solidFill>
@@ -23886,7 +24102,7 @@
               <a:t>2、 有序广播：</a:t>
             </a:r>
             <a:r>
-              <a:rPr lang="zh-CN" altLang="en-US" sz="2000" b="1">
+              <a:rPr lang="zh-CN" altLang="en-US" sz="2000" b="1" dirty="0">
                 <a:solidFill>
                   <a:srgbClr val="00B050"/>
                 </a:solidFill>
@@ -23894,30 +24110,30 @@
               </a:rPr>
               <a:t>sendOrderedBroadcast</a:t>
             </a:r>
-            <a:endParaRPr lang="zh-CN" altLang="en-US"/>
+            <a:endParaRPr lang="zh-CN" altLang="en-US" dirty="0"/>
           </a:p>
           <a:p>
             <a:r>
-              <a:rPr lang="en-US" altLang="zh-CN"/>
+              <a:rPr lang="en-US" altLang="zh-CN" dirty="0"/>
               <a:t>	</a:t>
             </a:r>
           </a:p>
           <a:p>
             <a:r>
-              <a:rPr lang="en-US" altLang="zh-CN"/>
+              <a:rPr lang="en-US" altLang="zh-CN" dirty="0"/>
               <a:t>	</a:t>
             </a:r>
             <a:r>
-              <a:rPr lang="zh-CN" altLang="en-US"/>
+              <a:rPr lang="zh-CN" altLang="en-US" dirty="0"/>
               <a:t>处理顺序是按照不同优先级来区分</a:t>
             </a:r>
           </a:p>
           <a:p>
-            <a:endParaRPr lang="zh-CN" altLang="en-US"/>
+            <a:endParaRPr lang="zh-CN" altLang="en-US" dirty="0"/>
           </a:p>
           <a:p>
             <a:r>
-              <a:rPr lang="zh-CN" altLang="en-US" sz="2000" b="1">
+              <a:rPr lang="zh-CN" altLang="en-US" sz="2000" b="1" dirty="0">
                 <a:solidFill>
                   <a:srgbClr val="00B050"/>
                 </a:solidFill>
@@ -23925,7 +24141,7 @@
               <a:t>3、 粘性广播：</a:t>
             </a:r>
             <a:r>
-              <a:rPr lang="zh-CN" altLang="en-US" sz="2000" b="1">
+              <a:rPr lang="zh-CN" altLang="en-US" sz="2000" b="1" dirty="0">
                 <a:solidFill>
                   <a:srgbClr val="00B050"/>
                 </a:solidFill>
@@ -23933,38 +24149,23 @@
               </a:rPr>
               <a:t>sendStickyBroadcast</a:t>
             </a:r>
-            <a:endParaRPr lang="zh-CN" altLang="en-US"/>
+            <a:endParaRPr lang="zh-CN" altLang="en-US" dirty="0"/>
           </a:p>
           <a:p>
             <a:r>
-              <a:rPr lang="en-US" altLang="zh-CN"/>
+              <a:rPr lang="en-US" altLang="zh-CN" dirty="0"/>
               <a:t>	</a:t>
             </a:r>
           </a:p>
           <a:p>
             <a:r>
-              <a:rPr lang="en-US" altLang="zh-CN"/>
+              <a:rPr lang="en-US" altLang="zh-CN" dirty="0"/>
               <a:t>	</a:t>
             </a:r>
             <a:r>
-              <a:rPr lang="zh-CN" altLang="en-US"/>
+              <a:rPr lang="zh-CN" altLang="en-US" dirty="0"/>
               <a:t>在Android 5.0 &amp; API 21中已经失效，不建议使用。</a:t>
             </a:r>
-          </a:p>
-          <a:p>
-            <a:endParaRPr lang="zh-CN" altLang="en-US"/>
-          </a:p>
-          <a:p>
-            <a:endParaRPr lang="zh-CN" altLang="en-US"/>
-          </a:p>
-          <a:p>
-            <a:endParaRPr lang="zh-CN" altLang="en-US"/>
-          </a:p>
-          <a:p>
-            <a:endParaRPr lang="zh-CN" altLang="en-US"/>
-          </a:p>
-          <a:p>
-            <a:endParaRPr lang="zh-CN" altLang="en-US"/>
           </a:p>
         </p:txBody>
       </p:sp>
@@ -24307,7 +24508,13 @@
           <p:cNvGraphicFramePr>
             <a:graphicFrameLocks noGrp="1"/>
           </p:cNvGraphicFramePr>
-          <p:nvPr/>
+          <p:nvPr>
+            <p:extLst>
+              <p:ext uri="{D42A27DB-BD31-4B8C-83A1-F6EECF244321}">
+                <p14:modId xmlns:p14="http://schemas.microsoft.com/office/powerpoint/2010/main" val="690481823"/>
+              </p:ext>
+            </p:extLst>
+          </p:nvPr>
         </p:nvGraphicFramePr>
         <p:xfrm>
           <a:off x="347663" y="2114550"/>
@@ -24481,7 +24688,7 @@
                         <a:buFontTx/>
                         <a:buNone/>
                       </a:pPr>
-                      <a:endParaRPr kumimoji="0" lang="en-US" altLang="zh-CN" sz="1600" b="0" i="0" u="none" strike="noStrike" cap="none" normalizeH="0" baseline="0">
+                      <a:endParaRPr kumimoji="0" lang="en-US" altLang="zh-CN" sz="1600" b="0" i="0" u="none" strike="noStrike" cap="none" normalizeH="0" baseline="0" dirty="0">
                         <a:ln>
                           <a:noFill/>
                         </a:ln>
@@ -24511,7 +24718,7 @@
                         <a:buNone/>
                       </a:pPr>
                       <a:r>
-                        <a:rPr kumimoji="0" lang="en-US" altLang="zh-CN" sz="1600" b="0" i="0" u="none" strike="noStrike" cap="none" normalizeH="0" baseline="0">
+                        <a:rPr kumimoji="0" lang="en-US" altLang="zh-CN" sz="1600" b="0" i="0" u="none" strike="noStrike" cap="none" normalizeH="0" baseline="0" dirty="0">
                           <a:ln>
                             <a:noFill/>
                           </a:ln>
@@ -24523,22 +24730,67 @@
                           <a:ea typeface="宋体" panose="02010600030101010101" pitchFamily="2" charset="-122"/>
                           <a:sym typeface="Times New Roman" panose="02020603050405020304" pitchFamily="18" charset="0"/>
                         </a:rPr>
-                        <a:t>String Intent_Action = </a:t>
+                        <a:t>String </a:t>
                       </a:r>
                       <a:r>
-                        <a:rPr kumimoji="0" lang="en-US" altLang="zh-CN" sz="1600" b="1" i="0" u="none" strike="noStrike" cap="none" normalizeH="0" baseline="0">
+                        <a:rPr kumimoji="0" lang="en-US" altLang="zh-CN" sz="1600" b="0" i="0" u="none" strike="noStrike" cap="none" normalizeH="0" baseline="0" dirty="0" err="1">
                           <a:ln>
                             <a:noFill/>
                           </a:ln>
                           <a:solidFill>
-                            <a:srgbClr val="0070C0"/>
+                            <a:schemeClr val="tx1"/>
                           </a:solidFill>
                           <a:effectLst/>
                           <a:latin typeface="Times New Roman" panose="02020603050405020304" pitchFamily="18" charset="0"/>
                           <a:ea typeface="宋体" panose="02010600030101010101" pitchFamily="2" charset="-122"/>
                           <a:sym typeface="Times New Roman" panose="02020603050405020304" pitchFamily="18" charset="0"/>
                         </a:rPr>
-                        <a:t>com.android.BroadcastReceiverDemo;</a:t>
+                        <a:t>Intent_Action</a:t>
+                      </a:r>
+                      <a:r>
+                        <a:rPr kumimoji="0" lang="en-US" altLang="zh-CN" sz="1600" b="0" i="0" u="none" strike="noStrike" cap="none" normalizeH="0" baseline="0" dirty="0">
+                          <a:ln>
+                            <a:noFill/>
+                          </a:ln>
+                          <a:solidFill>
+                            <a:schemeClr val="tx1"/>
+                          </a:solidFill>
+                          <a:effectLst/>
+                          <a:latin typeface="Times New Roman" panose="02020603050405020304" pitchFamily="18" charset="0"/>
+                          <a:ea typeface="宋体" panose="02010600030101010101" pitchFamily="2" charset="-122"/>
+                          <a:sym typeface="Times New Roman" panose="02020603050405020304" pitchFamily="18" charset="0"/>
+                        </a:rPr>
+                        <a:t> = </a:t>
+                      </a:r>
+                      <a:r>
+                        <a:rPr kumimoji="0" lang="en-US" altLang="zh-CN" sz="1600" b="1" i="0" u="none" strike="noStrike" cap="none" normalizeH="0" baseline="0" dirty="0" err="1">
+                          <a:ln>
+                            <a:noFill/>
+                          </a:ln>
+                          <a:solidFill>
+                            <a:srgbClr val="0070C0"/>
+                          </a:solidFill>
+                          <a:effectLst/>
+                          <a:latin typeface="Times New Roman" panose="02020603050405020304" pitchFamily="18" charset="0"/>
+                          <a:ea typeface="宋体" panose="02010600030101010101" pitchFamily="2" charset="-122"/>
+                          <a:sym typeface="Times New Roman" panose="02020603050405020304" pitchFamily="18" charset="0"/>
+                        </a:rPr>
+                        <a:t>com.android.BroadcastReceiverDemo</a:t>
+                      </a:r>
+                      <a:r>
+                        <a:rPr kumimoji="0" lang="en-US" altLang="zh-CN" sz="1600" b="1" i="0" u="none" strike="noStrike" cap="none" normalizeH="0" baseline="0" dirty="0">
+                          <a:ln>
+                            <a:noFill/>
+                          </a:ln>
+                          <a:solidFill>
+                            <a:srgbClr val="0070C0"/>
+                          </a:solidFill>
+                          <a:effectLst/>
+                          <a:latin typeface="Times New Roman" panose="02020603050405020304" pitchFamily="18" charset="0"/>
+                          <a:ea typeface="宋体" panose="02010600030101010101" pitchFamily="2" charset="-122"/>
+                          <a:sym typeface="Times New Roman" panose="02020603050405020304" pitchFamily="18" charset="0"/>
+                        </a:rPr>
+                        <a:t>;</a:t>
                       </a:r>
                     </a:p>
                     <a:p>
@@ -24558,7 +24810,7 @@
                         <a:buNone/>
                       </a:pPr>
                       <a:r>
-                        <a:rPr kumimoji="0" lang="en-US" altLang="zh-CN" sz="1600" b="0" i="0" u="none" strike="noStrike" cap="none" normalizeH="0" baseline="0">
+                        <a:rPr kumimoji="0" lang="en-US" altLang="zh-CN" sz="1600" b="0" i="0" u="none" strike="noStrike" cap="none" normalizeH="0" baseline="0" dirty="0">
                           <a:ln>
                             <a:noFill/>
                           </a:ln>
@@ -24570,10 +24822,40 @@
                           <a:ea typeface="宋体" panose="02010600030101010101" pitchFamily="2" charset="-122"/>
                           <a:sym typeface="Times New Roman" panose="02020603050405020304" pitchFamily="18" charset="0"/>
                         </a:rPr>
-                        <a:t>Intent intent = new Intent</a:t>
+                        <a:t>Intent </a:t>
                       </a:r>
                       <a:r>
-                        <a:rPr kumimoji="0" lang="zh-CN" altLang="en-US" sz="1600" b="0" i="0" u="none" strike="noStrike" cap="none" normalizeH="0" baseline="0">
+                        <a:rPr kumimoji="0" lang="en-US" altLang="zh-CN" sz="1600" b="0" i="0" u="none" strike="noStrike" cap="none" normalizeH="0" baseline="0" dirty="0" err="1">
+                          <a:ln>
+                            <a:noFill/>
+                          </a:ln>
+                          <a:solidFill>
+                            <a:schemeClr val="tx1"/>
+                          </a:solidFill>
+                          <a:effectLst/>
+                          <a:latin typeface="Times New Roman" panose="02020603050405020304" pitchFamily="18" charset="0"/>
+                          <a:ea typeface="宋体" panose="02010600030101010101" pitchFamily="2" charset="-122"/>
+                          <a:sym typeface="Times New Roman" panose="02020603050405020304" pitchFamily="18" charset="0"/>
+                        </a:rPr>
+                        <a:t>intent</a:t>
+                      </a:r>
+                      <a:r>
+                        <a:rPr kumimoji="0" lang="en-US" altLang="zh-CN" sz="1600" b="0" i="0" u="none" strike="noStrike" cap="none" normalizeH="0" baseline="0" dirty="0">
+                          <a:ln>
+                            <a:noFill/>
+                          </a:ln>
+                          <a:solidFill>
+                            <a:schemeClr val="tx1"/>
+                          </a:solidFill>
+                          <a:effectLst/>
+                          <a:latin typeface="Times New Roman" panose="02020603050405020304" pitchFamily="18" charset="0"/>
+                          <a:ea typeface="宋体" panose="02010600030101010101" pitchFamily="2" charset="-122"/>
+                          <a:sym typeface="Times New Roman" panose="02020603050405020304" pitchFamily="18" charset="0"/>
+                        </a:rPr>
+                        <a:t> = new Intent</a:t>
+                      </a:r>
+                      <a:r>
+                        <a:rPr kumimoji="0" lang="zh-CN" altLang="en-US" sz="1600" b="0" i="0" u="none" strike="noStrike" cap="none" normalizeH="0" baseline="0" dirty="0">
                           <a:ln>
                             <a:noFill/>
                           </a:ln>
@@ -24588,7 +24870,7 @@
                         <a:t>（</a:t>
                       </a:r>
                       <a:r>
-                        <a:rPr kumimoji="0" lang="en-US" altLang="zh-CN" sz="1600" b="0" i="0" u="none" strike="noStrike" cap="none" normalizeH="0" baseline="0">
+                        <a:rPr kumimoji="0" lang="en-US" altLang="zh-CN" sz="1600" b="0" i="0" u="none" strike="noStrike" cap="none" normalizeH="0" baseline="0" dirty="0" err="1">
                           <a:ln>
                             <a:noFill/>
                           </a:ln>
@@ -24603,7 +24885,7 @@
                         <a:t>Intent_Action</a:t>
                       </a:r>
                       <a:r>
-                        <a:rPr kumimoji="0" lang="zh-CN" altLang="en-US" sz="1600" b="0" i="0" u="none" strike="noStrike" cap="none" normalizeH="0" baseline="0">
+                        <a:rPr kumimoji="0" lang="zh-CN" altLang="en-US" sz="1600" b="0" i="0" u="none" strike="noStrike" cap="none" normalizeH="0" baseline="0" dirty="0">
                           <a:ln>
                             <a:noFill/>
                           </a:ln>
@@ -24618,7 +24900,7 @@
                         <a:t>）</a:t>
                       </a:r>
                       <a:r>
-                        <a:rPr kumimoji="0" lang="en-US" altLang="zh-CN" sz="1600" b="0" i="0" u="none" strike="noStrike" cap="none" normalizeH="0" baseline="0">
+                        <a:rPr kumimoji="0" lang="en-US" altLang="zh-CN" sz="1600" b="0" i="0" u="none" strike="noStrike" cap="none" normalizeH="0" baseline="0" dirty="0">
                           <a:ln>
                             <a:noFill/>
                           </a:ln>
@@ -24632,7 +24914,7 @@
                         </a:rPr>
                         <a:t>;</a:t>
                       </a:r>
-                      <a:endParaRPr kumimoji="0" lang="zh-CN" altLang="en-US" sz="1600" b="0" i="0" u="none" strike="noStrike" cap="none" normalizeH="0" baseline="0">
+                      <a:endParaRPr kumimoji="0" lang="zh-CN" altLang="en-US" sz="1600" b="0" i="0" u="none" strike="noStrike" cap="none" normalizeH="0" baseline="0" dirty="0">
                         <a:ln>
                           <a:noFill/>
                         </a:ln>
@@ -24662,7 +24944,7 @@
                         <a:buNone/>
                       </a:pPr>
                       <a:r>
-                        <a:rPr kumimoji="0" lang="en-US" altLang="zh-CN" sz="1600" b="0" i="0" u="none" strike="noStrike" cap="none" normalizeH="0" baseline="0">
+                        <a:rPr kumimoji="0" lang="en-US" altLang="zh-CN" sz="1600" b="0" i="0" u="none" strike="noStrike" cap="none" normalizeH="0" baseline="0" dirty="0" err="1">
                           <a:ln>
                             <a:noFill/>
                           </a:ln>
@@ -24677,7 +24959,7 @@
                         <a:t>Intent.putExtra</a:t>
                       </a:r>
                       <a:r>
-                        <a:rPr kumimoji="0" lang="zh-CN" altLang="en-US" sz="1600" b="0" i="0" u="none" strike="noStrike" cap="none" normalizeH="0" baseline="0">
+                        <a:rPr kumimoji="0" lang="zh-CN" altLang="en-US" sz="1600" b="0" i="0" u="none" strike="noStrike" cap="none" normalizeH="0" baseline="0" dirty="0">
                           <a:ln>
                             <a:noFill/>
                           </a:ln>
@@ -24692,7 +24974,7 @@
                         <a:t>（</a:t>
                       </a:r>
                       <a:r>
-                        <a:rPr kumimoji="0" lang="en-US" altLang="zh-CN" sz="1600" b="0" i="0" u="none" strike="noStrike" cap="none" normalizeH="0" baseline="0">
+                        <a:rPr kumimoji="0" lang="en-US" altLang="zh-CN" sz="1600" b="0" i="0" u="none" strike="noStrike" cap="none" normalizeH="0" baseline="0" dirty="0">
                           <a:ln>
                             <a:noFill/>
                           </a:ln>
@@ -24707,7 +24989,7 @@
                         <a:t>“</a:t>
                       </a:r>
                       <a:r>
-                        <a:rPr kumimoji="0" lang="zh-CN" altLang="en-US" sz="1600" b="0" i="0" u="none" strike="noStrike" cap="none" normalizeH="0" baseline="0">
+                        <a:rPr kumimoji="0" lang="zh-CN" altLang="en-US" sz="1600" b="0" i="0" u="none" strike="noStrike" cap="none" normalizeH="0" baseline="0" dirty="0">
                           <a:ln>
                             <a:noFill/>
                           </a:ln>
@@ -24722,7 +25004,7 @@
                         <a:t>参数</a:t>
                       </a:r>
                       <a:r>
-                        <a:rPr kumimoji="0" lang="en-US" altLang="zh-CN" sz="1600" b="0" i="0" u="none" strike="noStrike" cap="none" normalizeH="0" baseline="0">
+                        <a:rPr kumimoji="0" lang="en-US" altLang="zh-CN" sz="1600" b="0" i="0" u="none" strike="noStrike" cap="none" normalizeH="0" baseline="0" dirty="0">
                           <a:ln>
                             <a:noFill/>
                           </a:ln>
@@ -24737,7 +25019,7 @@
                         <a:t>”</a:t>
                       </a:r>
                       <a:r>
-                        <a:rPr kumimoji="0" lang="zh-CN" altLang="en-US" sz="1600" b="0" i="0" u="none" strike="noStrike" cap="none" normalizeH="0" baseline="0">
+                        <a:rPr kumimoji="0" lang="zh-CN" altLang="en-US" sz="1600" b="0" i="0" u="none" strike="noStrike" cap="none" normalizeH="0" baseline="0" dirty="0">
                           <a:ln>
                             <a:noFill/>
                           </a:ln>
@@ -24752,7 +25034,7 @@
                         <a:t>，</a:t>
                       </a:r>
                       <a:r>
-                        <a:rPr kumimoji="0" lang="en-US" altLang="zh-CN" sz="1600" b="0" i="0" u="none" strike="noStrike" cap="none" normalizeH="0" baseline="0">
+                        <a:rPr kumimoji="0" lang="en-US" altLang="zh-CN" sz="1600" b="0" i="0" u="none" strike="noStrike" cap="none" normalizeH="0" baseline="0" dirty="0">
                           <a:ln>
                             <a:noFill/>
                           </a:ln>
@@ -24767,7 +25049,7 @@
                         <a:t>“</a:t>
                       </a:r>
                       <a:r>
-                        <a:rPr kumimoji="0" lang="zh-CN" altLang="en-US" sz="1600" b="0" i="0" u="none" strike="noStrike" cap="none" normalizeH="0" baseline="0">
+                        <a:rPr kumimoji="0" lang="zh-CN" altLang="en-US" sz="1600" b="0" i="0" u="none" strike="noStrike" cap="none" normalizeH="0" baseline="0" dirty="0">
                           <a:ln>
                             <a:noFill/>
                           </a:ln>
@@ -24782,7 +25064,7 @@
                         <a:t>参数值</a:t>
                       </a:r>
                       <a:r>
-                        <a:rPr kumimoji="0" lang="en-US" altLang="zh-CN" sz="1600" b="0" i="0" u="none" strike="noStrike" cap="none" normalizeH="0" baseline="0">
+                        <a:rPr kumimoji="0" lang="en-US" altLang="zh-CN" sz="1600" b="0" i="0" u="none" strike="noStrike" cap="none" normalizeH="0" baseline="0" dirty="0">
                           <a:ln>
                             <a:noFill/>
                           </a:ln>
@@ -24797,7 +25079,7 @@
                         <a:t>”</a:t>
                       </a:r>
                       <a:r>
-                        <a:rPr kumimoji="0" lang="zh-CN" altLang="en-US" sz="1600" b="0" i="0" u="none" strike="noStrike" cap="none" normalizeH="0" baseline="0">
+                        <a:rPr kumimoji="0" lang="zh-CN" altLang="en-US" sz="1600" b="0" i="0" u="none" strike="noStrike" cap="none" normalizeH="0" baseline="0" dirty="0">
                           <a:ln>
                             <a:noFill/>
                           </a:ln>
@@ -24829,7 +25111,7 @@
                         <a:buNone/>
                       </a:pPr>
                       <a:r>
-                        <a:rPr kumimoji="0" lang="en-US" altLang="zh-CN" sz="1600" b="1" i="0" u="none" strike="noStrike" cap="none" normalizeH="0" baseline="0">
+                        <a:rPr kumimoji="0" lang="en-US" altLang="zh-CN" sz="1600" b="1" i="0" u="none" strike="noStrike" cap="none" normalizeH="0" baseline="0" dirty="0" err="1">
                           <a:ln>
                             <a:noFill/>
                           </a:ln>
@@ -24844,7 +25126,7 @@
                         <a:t>SendBroadcast</a:t>
                       </a:r>
                       <a:r>
-                        <a:rPr kumimoji="0" lang="zh-CN" altLang="en-US" sz="1600" b="0" i="0" u="none" strike="noStrike" cap="none" normalizeH="0" baseline="0">
+                        <a:rPr kumimoji="0" lang="zh-CN" altLang="en-US" sz="1600" b="0" i="0" u="none" strike="noStrike" cap="none" normalizeH="0" baseline="0" dirty="0">
                           <a:ln>
                             <a:noFill/>
                           </a:ln>
@@ -24859,7 +25141,7 @@
                         <a:t>（</a:t>
                       </a:r>
                       <a:r>
-                        <a:rPr kumimoji="0" lang="en-US" altLang="zh-CN" sz="1600" b="0" i="0" u="none" strike="noStrike" cap="none" normalizeH="0" baseline="0">
+                        <a:rPr kumimoji="0" lang="en-US" altLang="zh-CN" sz="1600" b="0" i="0" u="none" strike="noStrike" cap="none" normalizeH="0" baseline="0" dirty="0">
                           <a:ln>
                             <a:noFill/>
                           </a:ln>
@@ -24874,7 +25156,7 @@
                         <a:t>intent</a:t>
                       </a:r>
                       <a:r>
-                        <a:rPr kumimoji="0" lang="zh-CN" altLang="en-US" sz="1600" b="0" i="0" u="none" strike="noStrike" cap="none" normalizeH="0" baseline="0">
+                        <a:rPr kumimoji="0" lang="zh-CN" altLang="en-US" sz="1600" b="0" i="0" u="none" strike="noStrike" cap="none" normalizeH="0" baseline="0" dirty="0">
                           <a:ln>
                             <a:noFill/>
                           </a:ln>
@@ -24933,7 +25215,11 @@
                     <a:lnBlToTr>
                       <a:noFill/>
                     </a:lnBlToTr>
-                    <a:noFill/>
+                    <a:solidFill>
+                      <a:schemeClr val="bg1">
+                        <a:lumMod val="85000"/>
+                      </a:schemeClr>
+                    </a:solidFill>
                   </a:tcPr>
                 </a:tc>
                 <a:extLst>
@@ -25236,27 +25522,14 @@
           <a:prstGeom prst="rect">
             <a:avLst/>
           </a:prstGeom>
-          <a:noFill/>
+          <a:solidFill>
+            <a:schemeClr val="bg1">
+              <a:lumMod val="85000"/>
+            </a:schemeClr>
+          </a:solidFill>
           <a:ln>
             <a:noFill/>
           </a:ln>
-          <a:extLst>
-            <a:ext uri="{909E8E84-426E-40DD-AFC4-6F175D3DCCD1}">
-              <a14:hiddenFill xmlns:a14="http://schemas.microsoft.com/office/drawing/2010/main">
-                <a:solidFill>
-                  <a:srgbClr val="FFFFFF"/>
-                </a:solidFill>
-              </a14:hiddenFill>
-            </a:ext>
-            <a:ext uri="{91240B29-F687-4F45-9708-019B960494DF}">
-              <a14:hiddenLine xmlns:a14="http://schemas.microsoft.com/office/drawing/2010/main" w="9525">
-                <a:solidFill>
-                  <a:srgbClr val="000000"/>
-                </a:solidFill>
-                <a:bevel/>
-              </a14:hiddenLine>
-            </a:ext>
-          </a:extLst>
         </p:spPr>
         <p:txBody>
           <a:bodyPr/>
@@ -25670,93 +25943,123 @@
         </p:nvSpPr>
         <p:spPr bwMode="auto">
           <a:xfrm>
-            <a:off x="1038225" y="1327150"/>
-            <a:ext cx="7715250" cy="2306638"/>
+            <a:off x="714375" y="1325562"/>
+            <a:ext cx="7961910" cy="2306638"/>
           </a:xfrm>
           <a:prstGeom prst="rect">
             <a:avLst/>
           </a:prstGeom>
-          <a:noFill/>
+          <a:solidFill>
+            <a:schemeClr val="bg1">
+              <a:lumMod val="85000"/>
+            </a:schemeClr>
+          </a:solidFill>
           <a:ln>
             <a:noFill/>
           </a:ln>
-          <a:extLst>
-            <a:ext uri="{909E8E84-426E-40DD-AFC4-6F175D3DCCD1}">
-              <a14:hiddenFill xmlns:a14="http://schemas.microsoft.com/office/drawing/2010/main">
-                <a:solidFill>
-                  <a:srgbClr val="FFFFFF"/>
-                </a:solidFill>
-              </a14:hiddenFill>
-            </a:ext>
-            <a:ext uri="{91240B29-F687-4F45-9708-019B960494DF}">
-              <a14:hiddenLine xmlns:a14="http://schemas.microsoft.com/office/drawing/2010/main" w="9525">
-                <a:solidFill>
-                  <a:srgbClr val="000000"/>
-                </a:solidFill>
-                <a:miter lim="800000"/>
-                <a:headEnd/>
-                <a:tailEnd/>
-              </a14:hiddenLine>
-            </a:ext>
-          </a:extLst>
         </p:spPr>
         <p:txBody>
-          <a:bodyPr>
+          <a:bodyPr wrap="square">
             <a:spAutoFit/>
           </a:bodyPr>
           <a:lstStyle/>
           <a:p>
             <a:r>
-              <a:rPr lang="en-US" altLang="zh-CN" sz="1600">
+              <a:rPr lang="en-US" altLang="zh-CN" sz="1600" dirty="0">
                 <a:sym typeface="Arial" panose="020B0604020202020204" pitchFamily="34" charset="0"/>
               </a:rPr>
-              <a:t>public class MyBroadcastReceiver extends </a:t>
-            </a:r>
-            <a:r>
-              <a:rPr lang="en-US" altLang="zh-CN" sz="1600" b="1">
+              <a:t>public class </a:t>
+            </a:r>
+            <a:r>
+              <a:rPr lang="en-US" altLang="zh-CN" sz="1600" dirty="0" err="1">
+                <a:sym typeface="Arial" panose="020B0604020202020204" pitchFamily="34" charset="0"/>
+              </a:rPr>
+              <a:t>MyBroadcastReceiver</a:t>
+            </a:r>
+            <a:r>
+              <a:rPr lang="en-US" altLang="zh-CN" sz="1600" dirty="0">
+                <a:sym typeface="Arial" panose="020B0604020202020204" pitchFamily="34" charset="0"/>
+              </a:rPr>
+              <a:t> extends </a:t>
+            </a:r>
+            <a:r>
+              <a:rPr lang="en-US" altLang="zh-CN" sz="1600" b="1" dirty="0" err="1">
                 <a:solidFill>
                   <a:srgbClr val="00B050"/>
                 </a:solidFill>
                 <a:sym typeface="Arial" panose="020B0604020202020204" pitchFamily="34" charset="0"/>
               </a:rPr>
-              <a:t>BroadcastReceiver </a:t>
-            </a:r>
-            <a:r>
-              <a:rPr lang="en-US" altLang="zh-CN" sz="1600">
+              <a:t>BroadcastReceiver</a:t>
+            </a:r>
+            <a:r>
+              <a:rPr lang="en-US" altLang="zh-CN" sz="1600" b="1" dirty="0">
+                <a:solidFill>
+                  <a:srgbClr val="00B050"/>
+                </a:solidFill>
                 <a:sym typeface="Arial" panose="020B0604020202020204" pitchFamily="34" charset="0"/>
               </a:rPr>
+              <a:t> </a:t>
+            </a:r>
+            <a:r>
+              <a:rPr lang="en-US" altLang="zh-CN" sz="1600" dirty="0">
+                <a:sym typeface="Arial" panose="020B0604020202020204" pitchFamily="34" charset="0"/>
+              </a:rPr>
               <a:t>{ </a:t>
             </a:r>
-            <a:endParaRPr lang="zh-CN" altLang="en-US" sz="1600">
+            <a:endParaRPr lang="zh-CN" altLang="en-US" sz="1600" dirty="0">
               <a:sym typeface="Arial" panose="020B0604020202020204" pitchFamily="34" charset="0"/>
             </a:endParaRPr>
           </a:p>
           <a:p>
             <a:r>
-              <a:rPr lang="en-US" altLang="zh-CN" sz="1600">
+              <a:rPr lang="en-US" altLang="zh-CN" sz="1600" dirty="0">
                 <a:sym typeface="Arial" panose="020B0604020202020204" pitchFamily="34" charset="0"/>
               </a:rPr>
               <a:t>   </a:t>
             </a:r>
-            <a:endParaRPr lang="zh-CN" altLang="en-US" sz="1600">
+            <a:endParaRPr lang="zh-CN" altLang="en-US" sz="1600" dirty="0">
               <a:sym typeface="Arial" panose="020B0604020202020204" pitchFamily="34" charset="0"/>
             </a:endParaRPr>
           </a:p>
           <a:p>
             <a:r>
-              <a:rPr lang="zh-CN" altLang="en-US" sz="1600">
+              <a:rPr lang="zh-CN" altLang="en-US" sz="1600" dirty="0">
                 <a:sym typeface="Arial" panose="020B0604020202020204" pitchFamily="34" charset="0"/>
               </a:rPr>
               <a:t>    </a:t>
             </a:r>
             <a:r>
-              <a:rPr lang="en-US" altLang="zh-CN" sz="1600">
+              <a:rPr lang="en-US" altLang="zh-CN" sz="1600" dirty="0">
                 <a:sym typeface="Arial" panose="020B0604020202020204" pitchFamily="34" charset="0"/>
               </a:rPr>
-              <a:t>String  Intent_Action = com.android.BroadcastReceiverDemo; // action</a:t>
-            </a:r>
-            <a:r>
-              <a:rPr lang="zh-CN" altLang="en-US" sz="1600">
+              <a:t>String  </a:t>
+            </a:r>
+            <a:r>
+              <a:rPr lang="en-US" altLang="zh-CN" sz="1600" dirty="0" err="1">
+                <a:sym typeface="Arial" panose="020B0604020202020204" pitchFamily="34" charset="0"/>
+              </a:rPr>
+              <a:t>Intent_Action</a:t>
+            </a:r>
+            <a:r>
+              <a:rPr lang="en-US" altLang="zh-CN" sz="1600" dirty="0">
+                <a:sym typeface="Arial" panose="020B0604020202020204" pitchFamily="34" charset="0"/>
+              </a:rPr>
+              <a:t> = </a:t>
+            </a:r>
+            <a:r>
+              <a:rPr lang="en-US" altLang="zh-CN" sz="1600" dirty="0" err="1">
+                <a:sym typeface="Arial" panose="020B0604020202020204" pitchFamily="34" charset="0"/>
+              </a:rPr>
+              <a:t>com.android.BroadcastReceiverDemo</a:t>
+            </a:r>
+            <a:r>
+              <a:rPr lang="en-US" altLang="zh-CN" sz="1600" dirty="0">
+                <a:sym typeface="Arial" panose="020B0604020202020204" pitchFamily="34" charset="0"/>
+              </a:rPr>
+              <a:t>; // action</a:t>
+            </a:r>
+            <a:r>
+              <a:rPr lang="zh-CN" altLang="en-US" sz="1600" dirty="0">
                 <a:sym typeface="Arial" panose="020B0604020202020204" pitchFamily="34" charset="0"/>
               </a:rPr>
               <a:t>名称</a:t>
@@ -25764,7 +26067,7 @@
           </a:p>
           <a:p>
             <a:r>
-              <a:rPr lang="zh-CN" altLang="en-US" sz="1600">
+              <a:rPr lang="zh-CN" altLang="en-US" sz="1600" dirty="0">
                 <a:sym typeface="Arial" panose="020B0604020202020204" pitchFamily="34" charset="0"/>
               </a:rPr>
               <a:t> </a:t>
@@ -25772,13 +26075,13 @@
           </a:p>
           <a:p>
             <a:r>
-              <a:rPr lang="en-US" altLang="zh-CN" sz="1600">
+              <a:rPr lang="en-US" altLang="zh-CN" sz="1600" dirty="0">
                 <a:sym typeface="Arial" panose="020B0604020202020204" pitchFamily="34" charset="0"/>
               </a:rPr>
               <a:t>    public void </a:t>
             </a:r>
             <a:r>
-              <a:rPr lang="en-US" altLang="zh-CN" sz="1600" b="1">
+              <a:rPr lang="en-US" altLang="zh-CN" sz="1600" b="1" dirty="0" err="1">
                 <a:solidFill>
                   <a:srgbClr val="00B050"/>
                 </a:solidFill>
@@ -25787,35 +26090,71 @@
               <a:t>onReceive</a:t>
             </a:r>
             <a:r>
-              <a:rPr lang="en-US" altLang="zh-CN" sz="1600">
+              <a:rPr lang="en-US" altLang="zh-CN" sz="1600" dirty="0">
                 <a:sym typeface="Arial" panose="020B0604020202020204" pitchFamily="34" charset="0"/>
               </a:rPr>
-              <a:t>(Context context, Intent intent) { </a:t>
-            </a:r>
-            <a:endParaRPr lang="zh-CN" altLang="en-US" sz="1600">
+              <a:t>(Context </a:t>
+            </a:r>
+            <a:r>
+              <a:rPr lang="en-US" altLang="zh-CN" sz="1600" dirty="0" err="1">
+                <a:sym typeface="Arial" panose="020B0604020202020204" pitchFamily="34" charset="0"/>
+              </a:rPr>
+              <a:t>context</a:t>
+            </a:r>
+            <a:r>
+              <a:rPr lang="en-US" altLang="zh-CN" sz="1600" dirty="0">
+                <a:sym typeface="Arial" panose="020B0604020202020204" pitchFamily="34" charset="0"/>
+              </a:rPr>
+              <a:t>, Intent intent) { </a:t>
+            </a:r>
+            <a:endParaRPr lang="zh-CN" altLang="en-US" sz="1600" dirty="0">
               <a:sym typeface="Arial" panose="020B0604020202020204" pitchFamily="34" charset="0"/>
             </a:endParaRPr>
           </a:p>
           <a:p>
             <a:r>
-              <a:rPr lang="en-US" altLang="zh-CN" sz="1600">
+              <a:rPr lang="en-US" altLang="zh-CN" sz="1600" dirty="0">
                 <a:sym typeface="Arial" panose="020B0604020202020204" pitchFamily="34" charset="0"/>
               </a:rPr>
-              <a:t>      if ( intent.getAction().equals( Intent_Action)) { </a:t>
-            </a:r>
-            <a:endParaRPr lang="zh-CN" altLang="en-US" sz="1600">
+              <a:t>      if ( </a:t>
+            </a:r>
+            <a:r>
+              <a:rPr lang="en-US" altLang="zh-CN" sz="1600" dirty="0" err="1">
+                <a:sym typeface="Arial" panose="020B0604020202020204" pitchFamily="34" charset="0"/>
+              </a:rPr>
+              <a:t>intent.getAction</a:t>
+            </a:r>
+            <a:r>
+              <a:rPr lang="en-US" altLang="zh-CN" sz="1600" dirty="0">
+                <a:sym typeface="Arial" panose="020B0604020202020204" pitchFamily="34" charset="0"/>
+              </a:rPr>
+              <a:t>().equals( </a:t>
+            </a:r>
+            <a:r>
+              <a:rPr lang="en-US" altLang="zh-CN" sz="1600" dirty="0" err="1">
+                <a:sym typeface="Arial" panose="020B0604020202020204" pitchFamily="34" charset="0"/>
+              </a:rPr>
+              <a:t>Intent_Action</a:t>
+            </a:r>
+            <a:r>
+              <a:rPr lang="en-US" altLang="zh-CN" sz="1600" dirty="0">
+                <a:sym typeface="Arial" panose="020B0604020202020204" pitchFamily="34" charset="0"/>
+              </a:rPr>
+              <a:t>)) { </a:t>
+            </a:r>
+            <a:endParaRPr lang="zh-CN" altLang="en-US" sz="1600" dirty="0">
               <a:sym typeface="Arial" panose="020B0604020202020204" pitchFamily="34" charset="0"/>
             </a:endParaRPr>
           </a:p>
           <a:p>
             <a:r>
-              <a:rPr lang="en-US" altLang="zh-CN" sz="1600">
+              <a:rPr lang="en-US" altLang="zh-CN" sz="1600" dirty="0">
                 <a:sym typeface="Arial" panose="020B0604020202020204" pitchFamily="34" charset="0"/>
               </a:rPr>
               <a:t>        //</a:t>
             </a:r>
             <a:r>
-              <a:rPr lang="zh-CN" altLang="en-US" sz="1600">
+              <a:rPr lang="zh-CN" altLang="en-US" sz="1600" dirty="0">
                 <a:sym typeface="Arial" panose="020B0604020202020204" pitchFamily="34" charset="0"/>
               </a:rPr>
               <a:t>相应事件的处理</a:t>
@@ -25823,17 +26162,17 @@
           </a:p>
           <a:p>
             <a:r>
-              <a:rPr lang="en-US" altLang="zh-CN" sz="1600">
+              <a:rPr lang="en-US" altLang="zh-CN" sz="1600" dirty="0">
                 <a:sym typeface="Arial" panose="020B0604020202020204" pitchFamily="34" charset="0"/>
               </a:rPr>
               <a:t>      } </a:t>
             </a:r>
-            <a:endParaRPr lang="zh-CN" altLang="en-US" sz="1600">
+            <a:endParaRPr lang="zh-CN" altLang="en-US" sz="1600" dirty="0">
               <a:sym typeface="Arial" panose="020B0604020202020204" pitchFamily="34" charset="0"/>
             </a:endParaRPr>
           </a:p>
           <a:p>
-            <a:endParaRPr lang="zh-CN" altLang="en-US" sz="1600">
+            <a:endParaRPr lang="zh-CN" altLang="en-US" sz="1600" dirty="0">
               <a:sym typeface="Arial" panose="020B0604020202020204" pitchFamily="34" charset="0"/>
             </a:endParaRPr>
           </a:p>
@@ -26045,8 +26384,8 @@
         </p:nvSpPr>
         <p:spPr bwMode="auto">
           <a:xfrm>
-            <a:off x="431800" y="3817938"/>
-            <a:ext cx="8143875" cy="1060450"/>
+            <a:off x="714375" y="3817938"/>
+            <a:ext cx="7961910" cy="1060450"/>
           </a:xfrm>
           <a:prstGeom prst="rect">
             <a:avLst/>
@@ -26074,7 +26413,7 @@
           </a:extLst>
         </p:spPr>
         <p:txBody>
-          <a:bodyPr>
+          <a:bodyPr wrap="square">
             <a:spAutoFit/>
           </a:bodyPr>
           <a:lstStyle>
@@ -26221,11 +26560,66 @@
             </a:r>
             <a:r>
               <a:rPr lang="en-US" altLang="zh-CN" sz="1400" dirty="0" err="1">
+                <a:highlight>
+                  <a:srgbClr val="FFFF00"/>
+                </a:highlight>
                 <a:latin typeface="+mn-ea"/>
                 <a:ea typeface="+mn-ea"/>
                 <a:sym typeface="微软雅黑" panose="020B0503020204020204" pitchFamily="34" charset="-122"/>
               </a:rPr>
               <a:t>onReceiver</a:t>
+            </a:r>
+            <a:r>
+              <a:rPr lang="en-US" altLang="zh-CN" sz="1400" dirty="0">
+                <a:highlight>
+                  <a:srgbClr val="FFFF00"/>
+                </a:highlight>
+                <a:latin typeface="+mn-ea"/>
+                <a:ea typeface="+mn-ea"/>
+                <a:sym typeface="微软雅黑" panose="020B0503020204020204" pitchFamily="34" charset="-122"/>
+              </a:rPr>
+              <a:t>()</a:t>
+            </a:r>
+            <a:r>
+              <a:rPr lang="zh-CN" altLang="en-US" sz="1400" dirty="0">
+                <a:highlight>
+                  <a:srgbClr val="FFFF00"/>
+                </a:highlight>
+                <a:latin typeface="+mn-ea"/>
+                <a:ea typeface="+mn-ea"/>
+                <a:sym typeface="微软雅黑" panose="020B0503020204020204" pitchFamily="34" charset="-122"/>
+              </a:rPr>
+              <a:t>方法必须要在</a:t>
+            </a:r>
+            <a:r>
+              <a:rPr lang="en-US" altLang="zh-CN" sz="1400" dirty="0">
+                <a:highlight>
+                  <a:srgbClr val="FFFF00"/>
+                </a:highlight>
+                <a:latin typeface="+mn-ea"/>
+                <a:ea typeface="+mn-ea"/>
+                <a:sym typeface="微软雅黑" panose="020B0503020204020204" pitchFamily="34" charset="-122"/>
+              </a:rPr>
+              <a:t>10</a:t>
+            </a:r>
+            <a:r>
+              <a:rPr lang="zh-CN" altLang="en-US" sz="1400" dirty="0">
+                <a:highlight>
+                  <a:srgbClr val="FFFF00"/>
+                </a:highlight>
+                <a:latin typeface="+mn-ea"/>
+                <a:ea typeface="+mn-ea"/>
+                <a:sym typeface="微软雅黑" panose="020B0503020204020204" pitchFamily="34" charset="-122"/>
+              </a:rPr>
+              <a:t>秒钟内执行完事件</a:t>
+            </a:r>
+            <a:r>
+              <a:rPr lang="zh-CN" altLang="en-US" sz="1400" dirty="0">
+                <a:latin typeface="+mn-ea"/>
+                <a:ea typeface="+mn-ea"/>
+                <a:sym typeface="微软雅黑" panose="020B0503020204020204" pitchFamily="34" charset="-122"/>
+              </a:rPr>
+              <a:t>，否则</a:t>
             </a:r>
             <a:r>
               <a:rPr lang="en-US" altLang="zh-CN" sz="1400" dirty="0">
@@ -26233,7 +26627,7 @@
                 <a:ea typeface="+mn-ea"/>
                 <a:sym typeface="微软雅黑" panose="020B0503020204020204" pitchFamily="34" charset="-122"/>
               </a:rPr>
-              <a:t>()</a:t>
+              <a:t>Android</a:t>
             </a:r>
             <a:r>
               <a:rPr lang="zh-CN" altLang="en-US" sz="1400" dirty="0">
@@ -26241,39 +26635,28 @@
                 <a:ea typeface="+mn-ea"/>
                 <a:sym typeface="微软雅黑" panose="020B0503020204020204" pitchFamily="34" charset="-122"/>
               </a:rPr>
-              <a:t>方法必须要在</a:t>
-            </a:r>
-            <a:r>
-              <a:rPr lang="en-US" altLang="zh-CN" sz="1400" dirty="0">
-                <a:latin typeface="+mn-ea"/>
-                <a:ea typeface="+mn-ea"/>
-                <a:sym typeface="微软雅黑" panose="020B0503020204020204" pitchFamily="34" charset="-122"/>
-              </a:rPr>
-              <a:t>10</a:t>
-            </a:r>
+              <a:t>系统会认为该组件失去响应，并提示用户强行关闭该组件。</a:t>
+            </a:r>
+            <a:endParaRPr lang="en-US" altLang="zh-CN" sz="1400" dirty="0">
+              <a:latin typeface="+mn-ea"/>
+              <a:ea typeface="+mn-ea"/>
+              <a:sym typeface="微软雅黑" panose="020B0503020204020204" pitchFamily="34" charset="-122"/>
+            </a:endParaRPr>
+          </a:p>
+          <a:p>
+            <a:pPr eaLnBrk="1" hangingPunct="1">
+              <a:lnSpc>
+                <a:spcPct val="150000"/>
+              </a:lnSpc>
+              <a:defRPr/>
+            </a:pPr>
             <a:r>
               <a:rPr lang="zh-CN" altLang="en-US" sz="1400" dirty="0">
                 <a:latin typeface="+mn-ea"/>
                 <a:ea typeface="+mn-ea"/>
                 <a:sym typeface="微软雅黑" panose="020B0503020204020204" pitchFamily="34" charset="-122"/>
               </a:rPr>
-              <a:t>秒钟内执行完事件，否则</a:t>
-            </a:r>
-            <a:r>
-              <a:rPr lang="en-US" altLang="zh-CN" sz="1400" dirty="0">
-                <a:latin typeface="+mn-ea"/>
-                <a:ea typeface="+mn-ea"/>
-                <a:sym typeface="微软雅黑" panose="020B0503020204020204" pitchFamily="34" charset="-122"/>
-              </a:rPr>
-              <a:t>Android</a:t>
-            </a:r>
-            <a:r>
-              <a:rPr lang="zh-CN" altLang="en-US" sz="1400" dirty="0">
-                <a:latin typeface="+mn-ea"/>
-                <a:ea typeface="+mn-ea"/>
-                <a:sym typeface="微软雅黑" panose="020B0503020204020204" pitchFamily="34" charset="-122"/>
-              </a:rPr>
-              <a:t>系统会认为该组件失去响应，并提示用户强行关闭该组件。因此，对于比较耗时的响应事件，可以另开一线程，单独进行事件的处理。</a:t>
+              <a:t>因此，对于比较耗时的响应事件，可以另开一线程，单独进行事件的处理。</a:t>
             </a:r>
             <a:endParaRPr lang="zh-CN" altLang="en-US" dirty="0">
               <a:sym typeface="Arial" panose="020B0604020202020204" pitchFamily="34" charset="0"/>
@@ -26413,9 +26796,14 @@
         </p:nvSpPr>
         <p:spPr>
           <a:xfrm>
-            <a:off x="161925" y="915988"/>
-            <a:ext cx="8655050" cy="3633787"/>
+            <a:off x="161926" y="915988"/>
+            <a:ext cx="6474566" cy="3633787"/>
           </a:xfrm>
+          <a:solidFill>
+            <a:schemeClr val="bg1">
+              <a:lumMod val="85000"/>
+            </a:schemeClr>
+          </a:solidFill>
         </p:spPr>
         <p:txBody>
           <a:bodyPr>
@@ -26429,11 +26817,31 @@
             </a:pPr>
             <a:r>
               <a:rPr lang="zh-CN" altLang="en-US" sz="2400" b="1" noProof="1">
+                <a:highlight>
+                  <a:srgbClr val="FFFF00"/>
+                </a:highlight>
                 <a:latin typeface="微软雅黑" panose="020B0503020204020204" pitchFamily="34" charset="-122"/>
                 <a:ea typeface="微软雅黑" panose="020B0503020204020204" pitchFamily="34" charset="-122"/>
               </a:rPr>
-              <a:t>应用程序无响应</a:t>
-            </a:r>
+              <a:t>应用程序无响应 </a:t>
+            </a:r>
+            <a:r>
+              <a:rPr lang="en-US" altLang="zh-CN" sz="2400" b="1" noProof="1">
+                <a:highlight>
+                  <a:srgbClr val="FFFF00"/>
+                </a:highlight>
+                <a:latin typeface="微软雅黑" panose="020B0503020204020204" pitchFamily="34" charset="-122"/>
+                <a:ea typeface="微软雅黑" panose="020B0503020204020204" pitchFamily="34" charset="-122"/>
+              </a:rPr>
+              <a:t>ANR</a:t>
+            </a:r>
+            <a:endParaRPr lang="zh-CN" altLang="en-US" sz="2400" b="1" noProof="1">
+              <a:highlight>
+                <a:srgbClr val="FFFF00"/>
+              </a:highlight>
+              <a:latin typeface="微软雅黑" panose="020B0503020204020204" pitchFamily="34" charset="-122"/>
+              <a:ea typeface="微软雅黑" panose="020B0503020204020204" pitchFamily="34" charset="-122"/>
+            </a:endParaRPr>
           </a:p>
           <a:p>
             <a:pPr marL="0" indent="0" fontAlgn="auto">
@@ -26488,7 +26896,41 @@
                 <a:latin typeface="微软雅黑" panose="020B0503020204020204" pitchFamily="34" charset="-122"/>
                 <a:ea typeface="微软雅黑" panose="020B0503020204020204" pitchFamily="34" charset="-122"/>
               </a:rPr>
-              <a:t>用户可以选择“等待”而让程序继续运行，也可以选择“强制关闭”。</a:t>
+              <a:t>用户可以选择“</a:t>
+            </a:r>
+            <a:r>
+              <a:rPr lang="zh-CN" altLang="en-US" sz="1600" noProof="1">
+                <a:highlight>
+                  <a:srgbClr val="FFFF00"/>
+                </a:highlight>
+                <a:latin typeface="微软雅黑" panose="020B0503020204020204" pitchFamily="34" charset="-122"/>
+                <a:ea typeface="微软雅黑" panose="020B0503020204020204" pitchFamily="34" charset="-122"/>
+              </a:rPr>
+              <a:t>等待</a:t>
+            </a:r>
+            <a:r>
+              <a:rPr lang="zh-CN" altLang="en-US" sz="1600" noProof="1">
+                <a:latin typeface="微软雅黑" panose="020B0503020204020204" pitchFamily="34" charset="-122"/>
+                <a:ea typeface="微软雅黑" panose="020B0503020204020204" pitchFamily="34" charset="-122"/>
+              </a:rPr>
+              <a:t>”让程序继续运行，也可选择“</a:t>
+            </a:r>
+            <a:r>
+              <a:rPr lang="zh-CN" altLang="en-US" sz="1600" noProof="1">
+                <a:highlight>
+                  <a:srgbClr val="FFFF00"/>
+                </a:highlight>
+                <a:latin typeface="微软雅黑" panose="020B0503020204020204" pitchFamily="34" charset="-122"/>
+                <a:ea typeface="微软雅黑" panose="020B0503020204020204" pitchFamily="34" charset="-122"/>
+              </a:rPr>
+              <a:t>强制关闭</a:t>
+            </a:r>
+            <a:r>
+              <a:rPr lang="zh-CN" altLang="en-US" sz="1600" noProof="1">
+                <a:latin typeface="微软雅黑" panose="020B0503020204020204" pitchFamily="34" charset="-122"/>
+                <a:ea typeface="微软雅黑" panose="020B0503020204020204" pitchFamily="34" charset="-122"/>
+              </a:rPr>
+              <a:t>”。</a:t>
             </a:r>
           </a:p>
           <a:p>
@@ -26597,26 +27039,26 @@
           <a:lstStyle/>
           <a:p>
             <a:r>
-              <a:rPr lang="zh-CN" altLang="en-US"/>
+              <a:rPr lang="zh-CN" altLang="en-US" dirty="0"/>
               <a:t>扩展知识 ：</a:t>
             </a:r>
             <a:r>
-              <a:rPr lang="en-US" altLang="zh-CN" sz="2400"/>
+              <a:rPr lang="en-US" altLang="zh-CN" sz="2400" dirty="0"/>
               <a:t>ANR</a:t>
             </a:r>
             <a:r>
-              <a:rPr lang="zh-CN" altLang="en-US"/>
+              <a:rPr lang="zh-CN" altLang="en-US" dirty="0"/>
               <a:t>（</a:t>
             </a:r>
             <a:r>
-              <a:rPr lang="zh-CN" altLang="en-US">
+              <a:rPr lang="zh-CN" altLang="en-US" dirty="0">
                 <a:latin typeface="微软雅黑" panose="020B0503020204020204" pitchFamily="34" charset="-122"/>
                 <a:ea typeface="微软雅黑" panose="020B0503020204020204" pitchFamily="34" charset="-122"/>
               </a:rPr>
               <a:t>Application Not Responding</a:t>
             </a:r>
             <a:r>
-              <a:rPr lang="zh-CN" altLang="en-US"/>
+              <a:rPr lang="zh-CN" altLang="en-US" dirty="0"/>
               <a:t>）</a:t>
             </a:r>
           </a:p>
@@ -26651,7 +27093,7 @@
         </p:blipFill>
         <p:spPr bwMode="auto">
           <a:xfrm>
-            <a:off x="6700838" y="182563"/>
+            <a:off x="6700838" y="262403"/>
             <a:ext cx="2220912" cy="3317875"/>
           </a:xfrm>
           <a:prstGeom prst="rect">
@@ -26684,62 +27126,32 @@
       </p:pic>
       <p:pic>
         <p:nvPicPr>
-          <p:cNvPr id="16388" name="图片 1" descr="20170502010400_0625">
+          <p:cNvPr id="2" name="图片 1">
             <a:extLst>
               <a:ext uri="{FF2B5EF4-FFF2-40B4-BE49-F238E27FC236}">
-                <a16:creationId xmlns:a16="http://schemas.microsoft.com/office/drawing/2014/main" id="{B903CB1D-4B0C-4241-B788-0B1397AED0EB}"/>
+                <a16:creationId xmlns:a16="http://schemas.microsoft.com/office/drawing/2014/main" id="{A16EB404-7E63-49B8-BD43-BC58DED56B27}"/>
               </a:ext>
             </a:extLst>
           </p:cNvPr>
           <p:cNvPicPr>
-            <a:picLocks noChangeAspect="1" noChangeArrowheads="1"/>
+            <a:picLocks noChangeAspect="1"/>
           </p:cNvPicPr>
           <p:nvPr/>
         </p:nvPicPr>
         <p:blipFill>
-          <a:blip r:embed="rId4">
-            <a:extLst>
-              <a:ext uri="{28A0092B-C50C-407E-A947-70E740481C1C}">
-                <a14:useLocalDpi xmlns:a14="http://schemas.microsoft.com/office/drawing/2010/main" val="0"/>
-              </a:ext>
-            </a:extLst>
-          </a:blip>
-          <a:srcRect/>
+          <a:blip r:embed="rId4"/>
           <a:stretch>
             <a:fillRect/>
           </a:stretch>
         </p:blipFill>
-        <p:spPr bwMode="auto">
+        <p:spPr>
           <a:xfrm>
-            <a:off x="5400675" y="3297238"/>
-            <a:ext cx="3521075" cy="1776412"/>
+            <a:off x="6636491" y="3653828"/>
+            <a:ext cx="2285259" cy="1227269"/>
           </a:xfrm>
           <a:prstGeom prst="rect">
             <a:avLst/>
           </a:prstGeom>
-          <a:noFill/>
-          <a:ln>
-            <a:noFill/>
-          </a:ln>
-          <a:extLst>
-            <a:ext uri="{909E8E84-426E-40DD-AFC4-6F175D3DCCD1}">
-              <a14:hiddenFill xmlns:a14="http://schemas.microsoft.com/office/drawing/2010/main">
-                <a:solidFill>
-                  <a:srgbClr val="FFFFFF"/>
-                </a:solidFill>
-              </a14:hiddenFill>
-            </a:ext>
-            <a:ext uri="{91240B29-F687-4F45-9708-019B960494DF}">
-              <a14:hiddenLine xmlns:a14="http://schemas.microsoft.com/office/drawing/2010/main" w="9525">
-                <a:solidFill>
-                  <a:srgbClr val="000000"/>
-                </a:solidFill>
-                <a:miter lim="800000"/>
-                <a:headEnd/>
-                <a:tailEnd/>
-              </a14:hiddenLine>
-            </a:ext>
-          </a:extLst>
         </p:spPr>
       </p:pic>
     </p:spTree>
@@ -26971,29 +27383,14 @@
           <a:prstGeom prst="rect">
             <a:avLst/>
           </a:prstGeom>
-          <a:noFill/>
+          <a:solidFill>
+            <a:schemeClr val="bg1">
+              <a:lumMod val="85000"/>
+            </a:schemeClr>
+          </a:solidFill>
           <a:ln>
             <a:noFill/>
           </a:ln>
-          <a:extLst>
-            <a:ext uri="{909E8E84-426E-40DD-AFC4-6F175D3DCCD1}">
-              <a14:hiddenFill xmlns:a14="http://schemas.microsoft.com/office/drawing/2010/main">
-                <a:solidFill>
-                  <a:srgbClr val="FFFFFF"/>
-                </a:solidFill>
-              </a14:hiddenFill>
-            </a:ext>
-            <a:ext uri="{91240B29-F687-4F45-9708-019B960494DF}">
-              <a14:hiddenLine xmlns:a14="http://schemas.microsoft.com/office/drawing/2010/main" w="6350">
-                <a:solidFill>
-                  <a:srgbClr val="000000"/>
-                </a:solidFill>
-                <a:miter lim="800000"/>
-                <a:headEnd/>
-                <a:tailEnd/>
-              </a14:hiddenLine>
-            </a:ext>
-          </a:extLst>
         </p:spPr>
         <p:txBody>
           <a:bodyPr lIns="0" tIns="0" rIns="0" bIns="0" anchor="ctr">
@@ -27002,7 +27399,7 @@
           <a:lstStyle/>
           <a:p>
             <a:r>
-              <a:rPr lang="en-US" altLang="zh-CN" sz="1400">
+              <a:rPr lang="en-US" altLang="zh-CN" sz="1400" dirty="0">
                 <a:solidFill>
                   <a:srgbClr val="00B050"/>
                 </a:solidFill>
@@ -27011,7 +27408,7 @@
               <a:t>//</a:t>
             </a:r>
             <a:r>
-              <a:rPr lang="zh-CN" altLang="en-US" sz="1400">
+              <a:rPr lang="zh-CN" altLang="en-US" sz="1400" dirty="0">
                 <a:solidFill>
                   <a:srgbClr val="00B050"/>
                 </a:solidFill>
@@ -27022,27 +27419,54 @@
           </a:p>
           <a:p>
             <a:r>
-              <a:rPr lang="en-US" altLang="zh-CN" sz="1400" b="1">
+              <a:rPr lang="en-US" altLang="zh-CN" sz="1400" b="1" dirty="0" err="1">
                 <a:solidFill>
                   <a:srgbClr val="00B050"/>
                 </a:solidFill>
                 <a:sym typeface="Arial" panose="020B0604020202020204" pitchFamily="34" charset="0"/>
               </a:rPr>
-              <a:t>MyBroadcastReceiver  </a:t>
-            </a:r>
-            <a:r>
-              <a:rPr lang="en-US" altLang="zh-CN" sz="1400">
+              <a:t>MyBroadcastReceiver</a:t>
+            </a:r>
+            <a:r>
+              <a:rPr lang="en-US" altLang="zh-CN" sz="1400" b="1" dirty="0">
                 <a:solidFill>
                   <a:srgbClr val="00B050"/>
                 </a:solidFill>
                 <a:sym typeface="Arial" panose="020B0604020202020204" pitchFamily="34" charset="0"/>
               </a:rPr>
-              <a:t>receiver = new MyBroadcastReceiver ();</a:t>
+              <a:t>  </a:t>
+            </a:r>
+            <a:r>
+              <a:rPr lang="en-US" altLang="zh-CN" sz="1400" dirty="0">
+                <a:solidFill>
+                  <a:srgbClr val="00B050"/>
+                </a:solidFill>
+                <a:sym typeface="Arial" panose="020B0604020202020204" pitchFamily="34" charset="0"/>
+              </a:rPr>
+              <a:t>receiver = new </a:t>
+            </a:r>
+            <a:r>
+              <a:rPr lang="en-US" altLang="zh-CN" sz="1400" dirty="0" err="1">
+                <a:solidFill>
+                  <a:srgbClr val="00B050"/>
+                </a:solidFill>
+                <a:sym typeface="Arial" panose="020B0604020202020204" pitchFamily="34" charset="0"/>
+              </a:rPr>
+              <a:t>MyBroadcastReceiver</a:t>
+            </a:r>
+            <a:r>
+              <a:rPr lang="en-US" altLang="zh-CN" sz="1400" dirty="0">
+                <a:solidFill>
+                  <a:srgbClr val="00B050"/>
+                </a:solidFill>
+                <a:sym typeface="Arial" panose="020B0604020202020204" pitchFamily="34" charset="0"/>
+              </a:rPr>
+              <a:t> ();</a:t>
             </a:r>
           </a:p>
           <a:p>
             <a:r>
-              <a:rPr lang="en-US" altLang="zh-CN" sz="1400">
+              <a:rPr lang="en-US" altLang="zh-CN" sz="1400" dirty="0">
                 <a:solidFill>
                   <a:srgbClr val="00B050"/>
                 </a:solidFill>
@@ -27051,7 +27475,7 @@
               <a:t>//</a:t>
             </a:r>
             <a:r>
-              <a:rPr lang="zh-CN" altLang="en-US" sz="1400">
+              <a:rPr lang="zh-CN" altLang="en-US" sz="1400" dirty="0">
                 <a:solidFill>
                   <a:srgbClr val="00B050"/>
                 </a:solidFill>
@@ -27062,18 +27486,81 @@
           </a:p>
           <a:p>
             <a:r>
-              <a:rPr lang="en-US" altLang="zh-CN" sz="1400">
+              <a:rPr lang="en-US" altLang="zh-CN" sz="1400" dirty="0" err="1">
                 <a:solidFill>
                   <a:srgbClr val="00B050"/>
                 </a:solidFill>
                 <a:sym typeface="Arial" panose="020B0604020202020204" pitchFamily="34" charset="0"/>
               </a:rPr>
-              <a:t>IntentFilter intentFilter = new IntentFilter("Intent_Action");</a:t>
+              <a:t>IntentFilter</a:t>
+            </a:r>
+            <a:r>
+              <a:rPr lang="en-US" altLang="zh-CN" sz="1400" dirty="0">
+                <a:solidFill>
+                  <a:srgbClr val="00B050"/>
+                </a:solidFill>
+                <a:sym typeface="Arial" panose="020B0604020202020204" pitchFamily="34" charset="0"/>
+              </a:rPr>
+              <a:t> </a:t>
+            </a:r>
+            <a:r>
+              <a:rPr lang="en-US" altLang="zh-CN" sz="1400" dirty="0" err="1">
+                <a:solidFill>
+                  <a:srgbClr val="00B050"/>
+                </a:solidFill>
+                <a:sym typeface="Arial" panose="020B0604020202020204" pitchFamily="34" charset="0"/>
+              </a:rPr>
+              <a:t>intentFilter</a:t>
+            </a:r>
+            <a:r>
+              <a:rPr lang="en-US" altLang="zh-CN" sz="1400" dirty="0">
+                <a:solidFill>
+                  <a:srgbClr val="00B050"/>
+                </a:solidFill>
+                <a:sym typeface="Arial" panose="020B0604020202020204" pitchFamily="34" charset="0"/>
+              </a:rPr>
+              <a:t> = new </a:t>
+            </a:r>
+            <a:r>
+              <a:rPr lang="en-US" altLang="zh-CN" sz="1400" dirty="0" err="1">
+                <a:solidFill>
+                  <a:srgbClr val="00B050"/>
+                </a:solidFill>
+                <a:sym typeface="Arial" panose="020B0604020202020204" pitchFamily="34" charset="0"/>
+              </a:rPr>
+              <a:t>IntentFilter</a:t>
+            </a:r>
+            <a:r>
+              <a:rPr lang="en-US" altLang="zh-CN" sz="1400" dirty="0">
+                <a:solidFill>
+                  <a:srgbClr val="00B050"/>
+                </a:solidFill>
+                <a:sym typeface="Arial" panose="020B0604020202020204" pitchFamily="34" charset="0"/>
+              </a:rPr>
+              <a:t>("</a:t>
+            </a:r>
+            <a:r>
+              <a:rPr lang="en-US" altLang="zh-CN" sz="1400" dirty="0" err="1">
+                <a:solidFill>
+                  <a:srgbClr val="00B050"/>
+                </a:solidFill>
+                <a:sym typeface="Arial" panose="020B0604020202020204" pitchFamily="34" charset="0"/>
+              </a:rPr>
+              <a:t>Intent_Action</a:t>
+            </a:r>
+            <a:r>
+              <a:rPr lang="en-US" altLang="zh-CN" sz="1400" dirty="0">
+                <a:solidFill>
+                  <a:srgbClr val="00B050"/>
+                </a:solidFill>
+                <a:sym typeface="Arial" panose="020B0604020202020204" pitchFamily="34" charset="0"/>
+              </a:rPr>
+              <a:t>");</a:t>
             </a:r>
           </a:p>
           <a:p>
             <a:r>
-              <a:rPr lang="en-US" altLang="zh-CN" sz="1400">
+              <a:rPr lang="en-US" altLang="zh-CN" sz="1400" dirty="0">
                 <a:solidFill>
                   <a:srgbClr val="00B050"/>
                 </a:solidFill>
@@ -27082,7 +27569,7 @@
               <a:t>//</a:t>
             </a:r>
             <a:r>
-              <a:rPr lang="zh-CN" altLang="en-US" sz="1400">
+              <a:rPr lang="zh-CN" altLang="en-US" sz="1400" dirty="0">
                 <a:solidFill>
                   <a:srgbClr val="00B050"/>
                 </a:solidFill>
@@ -27093,7 +27580,7 @@
           </a:p>
           <a:p>
             <a:r>
-              <a:rPr lang="en-US" altLang="zh-CN" sz="1400" b="1">
+              <a:rPr lang="en-US" altLang="zh-CN" sz="1400" b="1" dirty="0" err="1">
                 <a:solidFill>
                   <a:srgbClr val="00B050"/>
                 </a:solidFill>
@@ -27102,7 +27589,7 @@
               <a:t>registerReceiver</a:t>
             </a:r>
             <a:r>
-              <a:rPr lang="en-US" altLang="zh-CN" sz="1400">
+              <a:rPr lang="en-US" altLang="zh-CN" sz="1400" dirty="0">
                 <a:solidFill>
                   <a:srgbClr val="00B050"/>
                 </a:solidFill>
@@ -27111,7 +27598,7 @@
               <a:t>(receiver</a:t>
             </a:r>
             <a:r>
-              <a:rPr lang="zh-CN" altLang="en-US" sz="1400">
+              <a:rPr lang="zh-CN" altLang="en-US" sz="1400" dirty="0">
                 <a:solidFill>
                   <a:srgbClr val="00B050"/>
                 </a:solidFill>
@@ -27120,13 +27607,22 @@
               <a:t>，</a:t>
             </a:r>
             <a:r>
-              <a:rPr lang="en-US" altLang="zh-CN" sz="1400">
+              <a:rPr lang="en-US" altLang="zh-CN" sz="1400" dirty="0" err="1">
                 <a:solidFill>
                   <a:srgbClr val="00B050"/>
                 </a:solidFill>
                 <a:sym typeface="Arial" panose="020B0604020202020204" pitchFamily="34" charset="0"/>
               </a:rPr>
-              <a:t>intentFilter);</a:t>
+              <a:t>intentFilter</a:t>
+            </a:r>
+            <a:r>
+              <a:rPr lang="en-US" altLang="zh-CN" sz="1400" dirty="0">
+                <a:solidFill>
+                  <a:srgbClr val="00B050"/>
+                </a:solidFill>
+                <a:sym typeface="Arial" panose="020B0604020202020204" pitchFamily="34" charset="0"/>
+              </a:rPr>
+              <a:t>);</a:t>
             </a:r>
           </a:p>
         </p:txBody>
@@ -27315,29 +27811,14 @@
           <a:prstGeom prst="rect">
             <a:avLst/>
           </a:prstGeom>
-          <a:noFill/>
+          <a:solidFill>
+            <a:schemeClr val="bg1">
+              <a:lumMod val="85000"/>
+            </a:schemeClr>
+          </a:solidFill>
           <a:ln>
             <a:noFill/>
           </a:ln>
-          <a:extLst>
-            <a:ext uri="{909E8E84-426E-40DD-AFC4-6F175D3DCCD1}">
-              <a14:hiddenFill xmlns:a14="http://schemas.microsoft.com/office/drawing/2010/main">
-                <a:solidFill>
-                  <a:srgbClr val="FFFFFF"/>
-                </a:solidFill>
-              </a14:hiddenFill>
-            </a:ext>
-            <a:ext uri="{91240B29-F687-4F45-9708-019B960494DF}">
-              <a14:hiddenLine xmlns:a14="http://schemas.microsoft.com/office/drawing/2010/main" w="6350">
-                <a:solidFill>
-                  <a:srgbClr val="000000"/>
-                </a:solidFill>
-                <a:miter lim="800000"/>
-                <a:headEnd/>
-                <a:tailEnd/>
-              </a14:hiddenLine>
-            </a:ext>
-          </a:extLst>
         </p:spPr>
         <p:txBody>
           <a:bodyPr lIns="0" tIns="0" rIns="0" bIns="0" anchor="ctr">
@@ -27346,7 +27827,7 @@
           <a:lstStyle/>
           <a:p>
             <a:r>
-              <a:rPr lang="en-US" altLang="zh-CN" sz="1400">
+              <a:rPr lang="en-US" altLang="zh-CN" sz="1400" dirty="0">
                 <a:solidFill>
                   <a:srgbClr val="00B050"/>
                 </a:solidFill>
@@ -27355,7 +27836,7 @@
               <a:t>&lt;</a:t>
             </a:r>
             <a:r>
-              <a:rPr lang="en-US" altLang="zh-CN" sz="1400" b="1">
+              <a:rPr lang="en-US" altLang="zh-CN" sz="1400" b="1" dirty="0">
                 <a:solidFill>
                   <a:srgbClr val="00B050"/>
                 </a:solidFill>
@@ -27366,18 +27847,54 @@
           </a:p>
           <a:p>
             <a:r>
-              <a:rPr lang="en-US" altLang="zh-CN" sz="1400">
+              <a:rPr lang="en-US" altLang="zh-CN" sz="1400" dirty="0">
                 <a:solidFill>
                   <a:srgbClr val="00B050"/>
                 </a:solidFill>
                 <a:sym typeface="Arial" panose="020B0604020202020204" pitchFamily="34" charset="0"/>
               </a:rPr>
-              <a:t>  android:name = "MyBroadcastReceiver" &gt;</a:t>
+              <a:t>  </a:t>
+            </a:r>
+            <a:r>
+              <a:rPr lang="en-US" altLang="zh-CN" sz="1400" dirty="0" err="1">
+                <a:solidFill>
+                  <a:srgbClr val="00B050"/>
+                </a:solidFill>
+                <a:sym typeface="Arial" panose="020B0604020202020204" pitchFamily="34" charset="0"/>
+              </a:rPr>
+              <a:t>android:name</a:t>
+            </a:r>
+            <a:r>
+              <a:rPr lang="en-US" altLang="zh-CN" sz="1400" dirty="0">
+                <a:solidFill>
+                  <a:srgbClr val="00B050"/>
+                </a:solidFill>
+                <a:sym typeface="Arial" panose="020B0604020202020204" pitchFamily="34" charset="0"/>
+              </a:rPr>
+              <a:t> = "</a:t>
+            </a:r>
+            <a:r>
+              <a:rPr lang="en-US" altLang="zh-CN" sz="1400" dirty="0" err="1">
+                <a:solidFill>
+                  <a:srgbClr val="00B050"/>
+                </a:solidFill>
+                <a:sym typeface="Arial" panose="020B0604020202020204" pitchFamily="34" charset="0"/>
+              </a:rPr>
+              <a:t>MyBroadcastReceiver</a:t>
+            </a:r>
+            <a:r>
+              <a:rPr lang="en-US" altLang="zh-CN" sz="1400" dirty="0">
+                <a:solidFill>
+                  <a:srgbClr val="00B050"/>
+                </a:solidFill>
+                <a:sym typeface="Arial" panose="020B0604020202020204" pitchFamily="34" charset="0"/>
+              </a:rPr>
+              <a:t>" &gt;</a:t>
             </a:r>
           </a:p>
           <a:p>
             <a:r>
-              <a:rPr lang="en-US" altLang="zh-CN" sz="1400">
+              <a:rPr lang="en-US" altLang="zh-CN" sz="1400" dirty="0">
                 <a:solidFill>
                   <a:srgbClr val="00B050"/>
                 </a:solidFill>
@@ -27388,18 +27905,54 @@
           </a:p>
           <a:p>
             <a:r>
-              <a:rPr lang="en-US" altLang="zh-CN" sz="1400">
+              <a:rPr lang="en-US" altLang="zh-CN" sz="1400" dirty="0">
                 <a:solidFill>
                   <a:srgbClr val="00B050"/>
                 </a:solidFill>
                 <a:sym typeface="Arial" panose="020B0604020202020204" pitchFamily="34" charset="0"/>
               </a:rPr>
-              <a:t>    &lt;action android:name = " com.androidbook.MyBroadcastReceiver"/&gt;</a:t>
+              <a:t>    &lt;action </a:t>
+            </a:r>
+            <a:r>
+              <a:rPr lang="en-US" altLang="zh-CN" sz="1400" dirty="0" err="1">
+                <a:solidFill>
+                  <a:srgbClr val="00B050"/>
+                </a:solidFill>
+                <a:sym typeface="Arial" panose="020B0604020202020204" pitchFamily="34" charset="0"/>
+              </a:rPr>
+              <a:t>android:name</a:t>
+            </a:r>
+            <a:r>
+              <a:rPr lang="en-US" altLang="zh-CN" sz="1400" dirty="0">
+                <a:solidFill>
+                  <a:srgbClr val="00B050"/>
+                </a:solidFill>
+                <a:sym typeface="Arial" panose="020B0604020202020204" pitchFamily="34" charset="0"/>
+              </a:rPr>
+              <a:t> = " </a:t>
+            </a:r>
+            <a:r>
+              <a:rPr lang="en-US" altLang="zh-CN" sz="1400" dirty="0" err="1">
+                <a:solidFill>
+                  <a:srgbClr val="00B050"/>
+                </a:solidFill>
+                <a:sym typeface="Arial" panose="020B0604020202020204" pitchFamily="34" charset="0"/>
+              </a:rPr>
+              <a:t>com.androidbook.MyBroadcastReceiver</a:t>
+            </a:r>
+            <a:r>
+              <a:rPr lang="en-US" altLang="zh-CN" sz="1400" dirty="0">
+                <a:solidFill>
+                  <a:srgbClr val="00B050"/>
+                </a:solidFill>
+                <a:sym typeface="Arial" panose="020B0604020202020204" pitchFamily="34" charset="0"/>
+              </a:rPr>
+              <a:t>"/&gt;</a:t>
             </a:r>
           </a:p>
           <a:p>
             <a:r>
-              <a:rPr lang="en-US" altLang="zh-CN" sz="1400">
+              <a:rPr lang="en-US" altLang="zh-CN" sz="1400" dirty="0">
                 <a:solidFill>
                   <a:srgbClr val="00B050"/>
                 </a:solidFill>
@@ -27410,7 +27963,7 @@
           </a:p>
           <a:p>
             <a:r>
-              <a:rPr lang="en-US" altLang="zh-CN" sz="1400">
+              <a:rPr lang="en-US" altLang="zh-CN" sz="1400" dirty="0">
                 <a:solidFill>
                   <a:srgbClr val="00B050"/>
                 </a:solidFill>
@@ -27419,7 +27972,7 @@
               <a:t>&lt;/</a:t>
             </a:r>
             <a:r>
-              <a:rPr lang="en-US" altLang="zh-CN" sz="1400" b="1">
+              <a:rPr lang="en-US" altLang="zh-CN" sz="1400" b="1" dirty="0">
                 <a:solidFill>
                   <a:srgbClr val="00B050"/>
                 </a:solidFill>
@@ -27428,7 +27981,7 @@
               <a:t>receiver</a:t>
             </a:r>
             <a:r>
-              <a:rPr lang="en-US" altLang="zh-CN" sz="1400">
+              <a:rPr lang="en-US" altLang="zh-CN" sz="1400" dirty="0">
                 <a:solidFill>
                   <a:srgbClr val="00B050"/>
                 </a:solidFill>

</xml_diff>